<commit_message>
#02-13 HP UI & 격추 연출수정
+ 이중화 설계 시나리오 수정
</commit_message>
<xml_diff>
--- a/Lab/Server/서버이중화 설계.pptx
+++ b/Lab/Server/서버이중화 설계.pptx
@@ -5,7 +5,7 @@
     <p:sldMasterId id="2147483648" r:id="rId1"/>
   </p:sldMasterIdLst>
   <p:notesMasterIdLst>
-    <p:notesMasterId r:id="rId13"/>
+    <p:notesMasterId r:id="rId14"/>
   </p:notesMasterIdLst>
   <p:sldIdLst>
     <p:sldId id="349" r:id="rId2"/>
@@ -17,8 +17,9 @@
     <p:sldId id="359" r:id="rId8"/>
     <p:sldId id="361" r:id="rId9"/>
     <p:sldId id="362" r:id="rId10"/>
-    <p:sldId id="354" r:id="rId11"/>
-    <p:sldId id="363" r:id="rId12"/>
+    <p:sldId id="364" r:id="rId11"/>
+    <p:sldId id="354" r:id="rId12"/>
+    <p:sldId id="363" r:id="rId13"/>
   </p:sldIdLst>
   <p:sldSz cx="12192000" cy="6858000"/>
   <p:notesSz cx="6858000" cy="9144000"/>
@@ -207,7 +208,7 @@
           <a:p>
             <a:fld id="{0AB6AAC6-CEAA-43D4-9FAD-A562E1DA21A9}" type="datetimeFigureOut">
               <a:rPr lang="ko-KR" altLang="en-US" smtClean="0"/>
-              <a:t>2023-01-30</a:t>
+              <a:t>2023-02-13</a:t>
             </a:fld>
             <a:endParaRPr lang="ko-KR" altLang="en-US"/>
           </a:p>
@@ -1043,7 +1044,91 @@
           <a:p>
             <a:fld id="{DE59A02C-23B9-4569-A4E3-AE452135103C}" type="slidenum">
               <a:rPr lang="ko-KR" altLang="en-US" smtClean="0"/>
-              <a:t>11</a:t>
+              <a:t>10</a:t>
+            </a:fld>
+            <a:endParaRPr lang="ko-KR" altLang="en-US"/>
+          </a:p>
+        </p:txBody>
+      </p:sp>
+    </p:spTree>
+    <p:extLst>
+      <p:ext uri="{BB962C8B-B14F-4D97-AF65-F5344CB8AC3E}">
+        <p14:creationId xmlns:p14="http://schemas.microsoft.com/office/powerpoint/2010/main" val="3908876742"/>
+      </p:ext>
+    </p:extLst>
+  </p:cSld>
+  <p:clrMapOvr>
+    <a:masterClrMapping/>
+  </p:clrMapOvr>
+</p:notes>
+</file>
+
+<file path=ppt/notesSlides/notesSlide8.xml><?xml version="1.0" encoding="utf-8"?>
+<p:notes xmlns:a="http://schemas.openxmlformats.org/drawingml/2006/main" xmlns:r="http://schemas.openxmlformats.org/officeDocument/2006/relationships" xmlns:p="http://schemas.openxmlformats.org/presentationml/2006/main">
+  <p:cSld>
+    <p:spTree>
+      <p:nvGrpSpPr>
+        <p:cNvPr id="1" name=""/>
+        <p:cNvGrpSpPr/>
+        <p:nvPr/>
+      </p:nvGrpSpPr>
+      <p:grpSpPr>
+        <a:xfrm>
+          <a:off x="0" y="0"/>
+          <a:ext cx="0" cy="0"/>
+          <a:chOff x="0" y="0"/>
+          <a:chExt cx="0" cy="0"/>
+        </a:xfrm>
+      </p:grpSpPr>
+      <p:sp>
+        <p:nvSpPr>
+          <p:cNvPr id="2" name="슬라이드 이미지 개체 틀 1"/>
+          <p:cNvSpPr>
+            <a:spLocks noGrp="1" noRot="1" noChangeAspect="1"/>
+          </p:cNvSpPr>
+          <p:nvPr>
+            <p:ph type="sldImg"/>
+          </p:nvPr>
+        </p:nvSpPr>
+        <p:spPr/>
+      </p:sp>
+      <p:sp>
+        <p:nvSpPr>
+          <p:cNvPr id="3" name="슬라이드 노트 개체 틀 2"/>
+          <p:cNvSpPr>
+            <a:spLocks noGrp="1"/>
+          </p:cNvSpPr>
+          <p:nvPr>
+            <p:ph type="body" idx="1"/>
+          </p:nvPr>
+        </p:nvSpPr>
+        <p:spPr/>
+        <p:txBody>
+          <a:bodyPr/>
+          <a:lstStyle/>
+          <a:p>
+            <a:endParaRPr lang="ko-KR" altLang="en-US"/>
+          </a:p>
+        </p:txBody>
+      </p:sp>
+      <p:sp>
+        <p:nvSpPr>
+          <p:cNvPr id="4" name="슬라이드 번호 개체 틀 3"/>
+          <p:cNvSpPr>
+            <a:spLocks noGrp="1"/>
+          </p:cNvSpPr>
+          <p:nvPr>
+            <p:ph type="sldNum" sz="quarter" idx="5"/>
+          </p:nvPr>
+        </p:nvSpPr>
+        <p:spPr/>
+        <p:txBody>
+          <a:bodyPr/>
+          <a:lstStyle/>
+          <a:p>
+            <a:fld id="{DE59A02C-23B9-4569-A4E3-AE452135103C}" type="slidenum">
+              <a:rPr lang="ko-KR" altLang="en-US" smtClean="0"/>
+              <a:t>12</a:t>
             </a:fld>
             <a:endParaRPr lang="ko-KR" altLang="en-US"/>
           </a:p>
@@ -1209,7 +1294,7 @@
           <a:p>
             <a:fld id="{8A50AAF3-43B3-4A8D-BC7E-D6AFBB3104FA}" type="datetimeFigureOut">
               <a:rPr lang="ko-KR" altLang="en-US" smtClean="0"/>
-              <a:t>2023-01-30</a:t>
+              <a:t>2023-02-13</a:t>
             </a:fld>
             <a:endParaRPr lang="ko-KR" altLang="en-US"/>
           </a:p>
@@ -1407,7 +1492,7 @@
           <a:p>
             <a:fld id="{8A50AAF3-43B3-4A8D-BC7E-D6AFBB3104FA}" type="datetimeFigureOut">
               <a:rPr lang="ko-KR" altLang="en-US" smtClean="0"/>
-              <a:t>2023-01-30</a:t>
+              <a:t>2023-02-13</a:t>
             </a:fld>
             <a:endParaRPr lang="ko-KR" altLang="en-US"/>
           </a:p>
@@ -1615,7 +1700,7 @@
           <a:p>
             <a:fld id="{8A50AAF3-43B3-4A8D-BC7E-D6AFBB3104FA}" type="datetimeFigureOut">
               <a:rPr lang="ko-KR" altLang="en-US" smtClean="0"/>
-              <a:t>2023-01-30</a:t>
+              <a:t>2023-02-13</a:t>
             </a:fld>
             <a:endParaRPr lang="ko-KR" altLang="en-US"/>
           </a:p>
@@ -1813,7 +1898,7 @@
           <a:p>
             <a:fld id="{8A50AAF3-43B3-4A8D-BC7E-D6AFBB3104FA}" type="datetimeFigureOut">
               <a:rPr lang="ko-KR" altLang="en-US" smtClean="0"/>
-              <a:t>2023-01-30</a:t>
+              <a:t>2023-02-13</a:t>
             </a:fld>
             <a:endParaRPr lang="ko-KR" altLang="en-US"/>
           </a:p>
@@ -2088,7 +2173,7 @@
           <a:p>
             <a:fld id="{8A50AAF3-43B3-4A8D-BC7E-D6AFBB3104FA}" type="datetimeFigureOut">
               <a:rPr lang="ko-KR" altLang="en-US" smtClean="0"/>
-              <a:t>2023-01-30</a:t>
+              <a:t>2023-02-13</a:t>
             </a:fld>
             <a:endParaRPr lang="ko-KR" altLang="en-US"/>
           </a:p>
@@ -2353,7 +2438,7 @@
           <a:p>
             <a:fld id="{8A50AAF3-43B3-4A8D-BC7E-D6AFBB3104FA}" type="datetimeFigureOut">
               <a:rPr lang="ko-KR" altLang="en-US" smtClean="0"/>
-              <a:t>2023-01-30</a:t>
+              <a:t>2023-02-13</a:t>
             </a:fld>
             <a:endParaRPr lang="ko-KR" altLang="en-US"/>
           </a:p>
@@ -2765,7 +2850,7 @@
           <a:p>
             <a:fld id="{8A50AAF3-43B3-4A8D-BC7E-D6AFBB3104FA}" type="datetimeFigureOut">
               <a:rPr lang="ko-KR" altLang="en-US" smtClean="0"/>
-              <a:t>2023-01-30</a:t>
+              <a:t>2023-02-13</a:t>
             </a:fld>
             <a:endParaRPr lang="ko-KR" altLang="en-US"/>
           </a:p>
@@ -2906,7 +2991,7 @@
           <a:p>
             <a:fld id="{8A50AAF3-43B3-4A8D-BC7E-D6AFBB3104FA}" type="datetimeFigureOut">
               <a:rPr lang="ko-KR" altLang="en-US" smtClean="0"/>
-              <a:t>2023-01-30</a:t>
+              <a:t>2023-02-13</a:t>
             </a:fld>
             <a:endParaRPr lang="ko-KR" altLang="en-US"/>
           </a:p>
@@ -3019,7 +3104,7 @@
           <a:p>
             <a:fld id="{8A50AAF3-43B3-4A8D-BC7E-D6AFBB3104FA}" type="datetimeFigureOut">
               <a:rPr lang="ko-KR" altLang="en-US" smtClean="0"/>
-              <a:t>2023-01-30</a:t>
+              <a:t>2023-02-13</a:t>
             </a:fld>
             <a:endParaRPr lang="ko-KR" altLang="en-US"/>
           </a:p>
@@ -3330,7 +3415,7 @@
           <a:p>
             <a:fld id="{8A50AAF3-43B3-4A8D-BC7E-D6AFBB3104FA}" type="datetimeFigureOut">
               <a:rPr lang="ko-KR" altLang="en-US" smtClean="0"/>
-              <a:t>2023-01-30</a:t>
+              <a:t>2023-02-13</a:t>
             </a:fld>
             <a:endParaRPr lang="ko-KR" altLang="en-US"/>
           </a:p>
@@ -3618,7 +3703,7 @@
           <a:p>
             <a:fld id="{8A50AAF3-43B3-4A8D-BC7E-D6AFBB3104FA}" type="datetimeFigureOut">
               <a:rPr lang="ko-KR" altLang="en-US" smtClean="0"/>
-              <a:t>2023-01-30</a:t>
+              <a:t>2023-02-13</a:t>
             </a:fld>
             <a:endParaRPr lang="ko-KR" altLang="en-US"/>
           </a:p>
@@ -3859,7 +3944,7 @@
           <a:p>
             <a:fld id="{8A50AAF3-43B3-4A8D-BC7E-D6AFBB3104FA}" type="datetimeFigureOut">
               <a:rPr lang="ko-KR" altLang="en-US" smtClean="0"/>
-              <a:t>2023-01-30</a:t>
+              <a:t>2023-02-13</a:t>
             </a:fld>
             <a:endParaRPr lang="ko-KR" altLang="en-US"/>
           </a:p>
@@ -4575,6 +4660,2056 @@
           <a:chExt cx="0" cy="0"/>
         </a:xfrm>
       </p:grpSpPr>
+      <p:sp>
+        <p:nvSpPr>
+          <p:cNvPr id="43" name="직사각형 42">
+            <a:extLst>
+              <a:ext uri="{FF2B5EF4-FFF2-40B4-BE49-F238E27FC236}">
+                <a16:creationId xmlns:a16="http://schemas.microsoft.com/office/drawing/2014/main" id="{CF41237B-F17E-4D38-9428-8CD750607860}"/>
+              </a:ext>
+            </a:extLst>
+          </p:cNvPr>
+          <p:cNvSpPr/>
+          <p:nvPr/>
+        </p:nvSpPr>
+        <p:spPr>
+          <a:xfrm>
+            <a:off x="0" y="0"/>
+            <a:ext cx="121920" cy="828000"/>
+          </a:xfrm>
+          <a:prstGeom prst="rect">
+            <a:avLst/>
+          </a:prstGeom>
+          <a:solidFill>
+            <a:schemeClr val="tx1">
+              <a:lumMod val="65000"/>
+              <a:lumOff val="35000"/>
+            </a:schemeClr>
+          </a:solidFill>
+          <a:ln>
+            <a:solidFill>
+              <a:schemeClr val="tx1">
+                <a:lumMod val="65000"/>
+                <a:lumOff val="35000"/>
+              </a:schemeClr>
+            </a:solidFill>
+          </a:ln>
+        </p:spPr>
+        <p:style>
+          <a:lnRef idx="2">
+            <a:schemeClr val="accent1">
+              <a:shade val="50000"/>
+            </a:schemeClr>
+          </a:lnRef>
+          <a:fillRef idx="1">
+            <a:schemeClr val="accent1"/>
+          </a:fillRef>
+          <a:effectRef idx="0">
+            <a:schemeClr val="accent1"/>
+          </a:effectRef>
+          <a:fontRef idx="minor">
+            <a:schemeClr val="lt1"/>
+          </a:fontRef>
+        </p:style>
+        <p:txBody>
+          <a:bodyPr rtlCol="0" anchor="ctr"/>
+          <a:lstStyle/>
+          <a:p>
+            <a:pPr algn="ctr"/>
+            <a:endParaRPr lang="ko-KR" altLang="en-US">
+              <a:latin typeface="맑은 고딕" panose="020B0503020000020004" pitchFamily="50" charset="-127"/>
+              <a:ea typeface="맑은 고딕" panose="020B0503020000020004" pitchFamily="50" charset="-127"/>
+            </a:endParaRPr>
+          </a:p>
+        </p:txBody>
+      </p:sp>
+      <p:sp>
+        <p:nvSpPr>
+          <p:cNvPr id="44" name="직사각형 43">
+            <a:extLst>
+              <a:ext uri="{FF2B5EF4-FFF2-40B4-BE49-F238E27FC236}">
+                <a16:creationId xmlns:a16="http://schemas.microsoft.com/office/drawing/2014/main" id="{8C5388AB-21EB-43E5-AC89-BC55E884C9B1}"/>
+              </a:ext>
+            </a:extLst>
+          </p:cNvPr>
+          <p:cNvSpPr/>
+          <p:nvPr/>
+        </p:nvSpPr>
+        <p:spPr>
+          <a:xfrm>
+            <a:off x="121920" y="0"/>
+            <a:ext cx="12070079" cy="396000"/>
+          </a:xfrm>
+          <a:prstGeom prst="rect">
+            <a:avLst/>
+          </a:prstGeom>
+          <a:solidFill>
+            <a:schemeClr val="tx1">
+              <a:lumMod val="50000"/>
+              <a:lumOff val="50000"/>
+            </a:schemeClr>
+          </a:solidFill>
+          <a:ln>
+            <a:solidFill>
+              <a:schemeClr val="tx1">
+                <a:lumMod val="50000"/>
+                <a:lumOff val="50000"/>
+              </a:schemeClr>
+            </a:solidFill>
+          </a:ln>
+        </p:spPr>
+        <p:style>
+          <a:lnRef idx="2">
+            <a:schemeClr val="accent1">
+              <a:shade val="50000"/>
+            </a:schemeClr>
+          </a:lnRef>
+          <a:fillRef idx="1">
+            <a:schemeClr val="accent1"/>
+          </a:fillRef>
+          <a:effectRef idx="0">
+            <a:schemeClr val="accent1"/>
+          </a:effectRef>
+          <a:fontRef idx="minor">
+            <a:schemeClr val="lt1"/>
+          </a:fontRef>
+        </p:style>
+        <p:txBody>
+          <a:bodyPr vert="horz" rtlCol="0" anchor="ctr"/>
+          <a:lstStyle/>
+          <a:p>
+            <a:pPr marL="36000"/>
+            <a:r>
+              <a:rPr lang="en-US" altLang="ko-KR" sz="2000" b="1" dirty="0">
+                <a:solidFill>
+                  <a:schemeClr val="bg1"/>
+                </a:solidFill>
+                <a:latin typeface="맑은 고딕" panose="020B0503020000020004" pitchFamily="50" charset="-127"/>
+                <a:ea typeface="맑은 고딕" panose="020B0503020000020004" pitchFamily="50" charset="-127"/>
+              </a:rPr>
+              <a:t>Failover</a:t>
+            </a:r>
+            <a:endParaRPr lang="ko-KR" altLang="en-US" sz="2000" b="1" dirty="0">
+              <a:solidFill>
+                <a:schemeClr val="bg1"/>
+              </a:solidFill>
+              <a:latin typeface="맑은 고딕" panose="020B0503020000020004" pitchFamily="50" charset="-127"/>
+              <a:ea typeface="맑은 고딕" panose="020B0503020000020004" pitchFamily="50" charset="-127"/>
+            </a:endParaRPr>
+          </a:p>
+        </p:txBody>
+      </p:sp>
+      <p:sp>
+        <p:nvSpPr>
+          <p:cNvPr id="11" name="직사각형 10">
+            <a:extLst>
+              <a:ext uri="{FF2B5EF4-FFF2-40B4-BE49-F238E27FC236}">
+                <a16:creationId xmlns:a16="http://schemas.microsoft.com/office/drawing/2014/main" id="{CEF481DC-51B6-4E8A-A578-D7044BF9EB12}"/>
+              </a:ext>
+            </a:extLst>
+          </p:cNvPr>
+          <p:cNvSpPr/>
+          <p:nvPr/>
+        </p:nvSpPr>
+        <p:spPr>
+          <a:xfrm>
+            <a:off x="361255" y="396000"/>
+            <a:ext cx="11469490" cy="6462000"/>
+          </a:xfrm>
+          <a:prstGeom prst="rect">
+            <a:avLst/>
+          </a:prstGeom>
+          <a:noFill/>
+          <a:ln>
+            <a:noFill/>
+          </a:ln>
+        </p:spPr>
+        <p:style>
+          <a:lnRef idx="2">
+            <a:schemeClr val="accent1">
+              <a:shade val="50000"/>
+            </a:schemeClr>
+          </a:lnRef>
+          <a:fillRef idx="1">
+            <a:schemeClr val="accent1"/>
+          </a:fillRef>
+          <a:effectRef idx="0">
+            <a:schemeClr val="accent1"/>
+          </a:effectRef>
+          <a:fontRef idx="minor">
+            <a:schemeClr val="lt1"/>
+          </a:fontRef>
+        </p:style>
+        <p:txBody>
+          <a:bodyPr rtlCol="0" anchor="t"/>
+          <a:lstStyle/>
+          <a:p>
+            <a:pPr marL="180000" indent="-285750">
+              <a:spcAft>
+                <a:spcPts val="2200"/>
+              </a:spcAft>
+              <a:buFont typeface="Arial" panose="020B0604020202020204" pitchFamily="34" charset="0"/>
+              <a:buChar char="•"/>
+              <a:defRPr/>
+            </a:pPr>
+            <a:r>
+              <a:rPr lang="ko-KR" altLang="en-US" sz="1600" b="1" u="sng" dirty="0">
+                <a:solidFill>
+                  <a:prstClr val="black">
+                    <a:lumMod val="85000"/>
+                    <a:lumOff val="15000"/>
+                  </a:prstClr>
+                </a:solidFill>
+                <a:latin typeface="맑은 고딕" panose="020B0503020000020004" pitchFamily="50" charset="-127"/>
+                <a:ea typeface="맑은 고딕" panose="020B0503020000020004" pitchFamily="50" charset="-127"/>
+              </a:rPr>
+              <a:t>수평 확장된 서버 간 </a:t>
+            </a:r>
+            <a:r>
+              <a:rPr lang="ko-KR" altLang="en-US" sz="1600" b="1" dirty="0">
+                <a:solidFill>
+                  <a:prstClr val="black">
+                    <a:lumMod val="85000"/>
+                    <a:lumOff val="15000"/>
+                  </a:prstClr>
+                </a:solidFill>
+                <a:latin typeface="맑은 고딕" panose="020B0503020000020004" pitchFamily="50" charset="-127"/>
+                <a:ea typeface="맑은 고딕" panose="020B0503020000020004" pitchFamily="50" charset="-127"/>
+              </a:rPr>
+              <a:t>통신이 끊어진 경우는 어떻게 되는가</a:t>
+            </a:r>
+            <a:endParaRPr lang="en-US" altLang="ko-KR" sz="1600" b="1" dirty="0">
+              <a:solidFill>
+                <a:prstClr val="black">
+                  <a:lumMod val="85000"/>
+                  <a:lumOff val="15000"/>
+                </a:prstClr>
+              </a:solidFill>
+              <a:latin typeface="맑은 고딕" panose="020B0503020000020004" pitchFamily="50" charset="-127"/>
+              <a:ea typeface="맑은 고딕" panose="020B0503020000020004" pitchFamily="50" charset="-127"/>
+            </a:endParaRPr>
+          </a:p>
+          <a:p>
+            <a:pPr>
+              <a:spcAft>
+                <a:spcPts val="2200"/>
+              </a:spcAft>
+              <a:defRPr/>
+            </a:pPr>
+            <a:r>
+              <a:rPr lang="ko-KR" altLang="en-US" sz="1600" b="1" dirty="0">
+                <a:solidFill>
+                  <a:prstClr val="black">
+                    <a:lumMod val="85000"/>
+                    <a:lumOff val="15000"/>
+                  </a:prstClr>
+                </a:solidFill>
+                <a:latin typeface="맑은 고딕" panose="020B0503020000020004" pitchFamily="50" charset="-127"/>
+                <a:ea typeface="맑은 고딕" panose="020B0503020000020004" pitchFamily="50" charset="-127"/>
+              </a:rPr>
+              <a:t>상황</a:t>
+            </a:r>
+            <a:r>
+              <a:rPr lang="en-US" altLang="ko-KR" sz="1400" dirty="0">
+                <a:solidFill>
+                  <a:prstClr val="black">
+                    <a:lumMod val="85000"/>
+                    <a:lumOff val="15000"/>
+                  </a:prstClr>
+                </a:solidFill>
+                <a:latin typeface="맑은 고딕" panose="020B0503020000020004" pitchFamily="50" charset="-127"/>
+                <a:ea typeface="맑은 고딕" panose="020B0503020000020004" pitchFamily="50" charset="-127"/>
+              </a:rPr>
+              <a:t> : </a:t>
+            </a:r>
+            <a:r>
+              <a:rPr lang="ko-KR" altLang="en-US" sz="1400" dirty="0">
+                <a:solidFill>
+                  <a:prstClr val="black">
+                    <a:lumMod val="85000"/>
+                    <a:lumOff val="15000"/>
+                  </a:prstClr>
+                </a:solidFill>
+                <a:latin typeface="맑은 고딕" panose="020B0503020000020004" pitchFamily="50" charset="-127"/>
+                <a:ea typeface="맑은 고딕" panose="020B0503020000020004" pitchFamily="50" charset="-127"/>
+              </a:rPr>
+              <a:t>서버간 통신이 끊어져 두 서버 모두가 상위 서버에게</a:t>
+            </a:r>
+            <a:endParaRPr lang="en-US" altLang="ko-KR" sz="1400" dirty="0">
+              <a:solidFill>
+                <a:prstClr val="black">
+                  <a:lumMod val="85000"/>
+                  <a:lumOff val="15000"/>
+                </a:prstClr>
+              </a:solidFill>
+              <a:latin typeface="맑은 고딕" panose="020B0503020000020004" pitchFamily="50" charset="-127"/>
+              <a:ea typeface="맑은 고딕" panose="020B0503020000020004" pitchFamily="50" charset="-127"/>
+            </a:endParaRPr>
+          </a:p>
+          <a:p>
+            <a:pPr>
+              <a:spcAft>
+                <a:spcPts val="2200"/>
+              </a:spcAft>
+              <a:defRPr/>
+            </a:pPr>
+            <a:r>
+              <a:rPr lang="en-US" altLang="ko-KR" sz="1400" dirty="0">
+                <a:solidFill>
+                  <a:prstClr val="black">
+                    <a:lumMod val="85000"/>
+                    <a:lumOff val="15000"/>
+                  </a:prstClr>
+                </a:solidFill>
+                <a:latin typeface="맑은 고딕" panose="020B0503020000020004" pitchFamily="50" charset="-127"/>
+                <a:ea typeface="맑은 고딕" panose="020B0503020000020004" pitchFamily="50" charset="-127"/>
+              </a:rPr>
+              <a:t> </a:t>
+            </a:r>
+            <a:r>
+              <a:rPr lang="ko-KR" altLang="en-US" sz="1400" dirty="0">
+                <a:solidFill>
+                  <a:prstClr val="black">
+                    <a:lumMod val="85000"/>
+                    <a:lumOff val="15000"/>
+                  </a:prstClr>
+                </a:solidFill>
+                <a:latin typeface="맑은 고딕" panose="020B0503020000020004" pitchFamily="50" charset="-127"/>
+                <a:ea typeface="맑은 고딕" panose="020B0503020000020004" pitchFamily="50" charset="-127"/>
+              </a:rPr>
+              <a:t>상대 측 서버가 다운되었다고 말하는 상황입니다</a:t>
+            </a:r>
+            <a:r>
+              <a:rPr lang="en-US" altLang="ko-KR" sz="1400" dirty="0">
+                <a:solidFill>
+                  <a:prstClr val="black">
+                    <a:lumMod val="85000"/>
+                    <a:lumOff val="15000"/>
+                  </a:prstClr>
+                </a:solidFill>
+                <a:latin typeface="맑은 고딕" panose="020B0503020000020004" pitchFamily="50" charset="-127"/>
+                <a:ea typeface="맑은 고딕" panose="020B0503020000020004" pitchFamily="50" charset="-127"/>
+              </a:rPr>
+              <a:t>.</a:t>
+            </a:r>
+          </a:p>
+          <a:p>
+            <a:pPr>
+              <a:spcAft>
+                <a:spcPts val="2200"/>
+              </a:spcAft>
+              <a:defRPr/>
+            </a:pPr>
+            <a:r>
+              <a:rPr lang="ko-KR" altLang="en-US" sz="1600" b="1" dirty="0">
+                <a:solidFill>
+                  <a:prstClr val="black">
+                    <a:lumMod val="85000"/>
+                    <a:lumOff val="15000"/>
+                  </a:prstClr>
+                </a:solidFill>
+                <a:latin typeface="맑은 고딕" panose="020B0503020000020004" pitchFamily="50" charset="-127"/>
+                <a:ea typeface="맑은 고딕" panose="020B0503020000020004" pitchFamily="50" charset="-127"/>
+              </a:rPr>
+              <a:t>해결방안</a:t>
+            </a:r>
+            <a:r>
+              <a:rPr lang="en-US" altLang="ko-KR" sz="1400" dirty="0">
+                <a:solidFill>
+                  <a:prstClr val="black">
+                    <a:lumMod val="85000"/>
+                    <a:lumOff val="15000"/>
+                  </a:prstClr>
+                </a:solidFill>
+                <a:latin typeface="맑은 고딕" panose="020B0503020000020004" pitchFamily="50" charset="-127"/>
+                <a:ea typeface="맑은 고딕" panose="020B0503020000020004" pitchFamily="50" charset="-127"/>
+              </a:rPr>
+              <a:t> : </a:t>
+            </a:r>
+            <a:r>
+              <a:rPr lang="ko-KR" altLang="en-US" sz="1400" dirty="0">
+                <a:solidFill>
+                  <a:prstClr val="black">
+                    <a:lumMod val="85000"/>
+                    <a:lumOff val="15000"/>
+                  </a:prstClr>
+                </a:solidFill>
+                <a:latin typeface="맑은 고딕" panose="020B0503020000020004" pitchFamily="50" charset="-127"/>
+                <a:ea typeface="맑은 고딕" panose="020B0503020000020004" pitchFamily="50" charset="-127"/>
+              </a:rPr>
+              <a:t>둘 이상의 하위 서버에게서 비슷한 시간대에 상대측 서버가</a:t>
+            </a:r>
+            <a:endParaRPr lang="en-US" altLang="ko-KR" sz="1400" dirty="0">
+              <a:solidFill>
+                <a:prstClr val="black">
+                  <a:lumMod val="85000"/>
+                  <a:lumOff val="15000"/>
+                </a:prstClr>
+              </a:solidFill>
+              <a:latin typeface="맑은 고딕" panose="020B0503020000020004" pitchFamily="50" charset="-127"/>
+              <a:ea typeface="맑은 고딕" panose="020B0503020000020004" pitchFamily="50" charset="-127"/>
+            </a:endParaRPr>
+          </a:p>
+          <a:p>
+            <a:pPr>
+              <a:spcAft>
+                <a:spcPts val="2200"/>
+              </a:spcAft>
+              <a:defRPr/>
+            </a:pPr>
+            <a:r>
+              <a:rPr lang="ko-KR" altLang="en-US" sz="1400" dirty="0">
+                <a:solidFill>
+                  <a:prstClr val="black">
+                    <a:lumMod val="85000"/>
+                    <a:lumOff val="15000"/>
+                  </a:prstClr>
+                </a:solidFill>
+                <a:latin typeface="맑은 고딕" panose="020B0503020000020004" pitchFamily="50" charset="-127"/>
+                <a:ea typeface="맑은 고딕" panose="020B0503020000020004" pitchFamily="50" charset="-127"/>
+              </a:rPr>
+              <a:t> 다운되었다는</a:t>
+            </a:r>
+            <a:r>
+              <a:rPr lang="en-US" altLang="ko-KR" sz="1400" dirty="0">
+                <a:solidFill>
+                  <a:prstClr val="black">
+                    <a:lumMod val="85000"/>
+                    <a:lumOff val="15000"/>
+                  </a:prstClr>
+                </a:solidFill>
+                <a:latin typeface="맑은 고딕" panose="020B0503020000020004" pitchFamily="50" charset="-127"/>
+                <a:ea typeface="맑은 고딕" panose="020B0503020000020004" pitchFamily="50" charset="-127"/>
+              </a:rPr>
+              <a:t> </a:t>
+            </a:r>
+            <a:r>
+              <a:rPr lang="ko-KR" altLang="en-US" sz="1400" dirty="0">
+                <a:solidFill>
+                  <a:prstClr val="black">
+                    <a:lumMod val="85000"/>
+                    <a:lumOff val="15000"/>
+                  </a:prstClr>
+                </a:solidFill>
+                <a:latin typeface="맑은 고딕" panose="020B0503020000020004" pitchFamily="50" charset="-127"/>
+                <a:ea typeface="맑은 고딕" panose="020B0503020000020004" pitchFamily="50" charset="-127"/>
+              </a:rPr>
+              <a:t>통보를 받게 되면</a:t>
+            </a:r>
+            <a:r>
+              <a:rPr lang="en-US" altLang="ko-KR" sz="1400" dirty="0">
+                <a:solidFill>
+                  <a:prstClr val="black">
+                    <a:lumMod val="85000"/>
+                    <a:lumOff val="15000"/>
+                  </a:prstClr>
+                </a:solidFill>
+                <a:latin typeface="맑은 고딕" panose="020B0503020000020004" pitchFamily="50" charset="-127"/>
+                <a:ea typeface="맑은 고딕" panose="020B0503020000020004" pitchFamily="50" charset="-127"/>
+              </a:rPr>
+              <a:t>, </a:t>
+            </a:r>
+            <a:r>
+              <a:rPr lang="ko-KR" altLang="en-US" sz="1400" dirty="0">
+                <a:solidFill>
+                  <a:prstClr val="black">
+                    <a:lumMod val="85000"/>
+                    <a:lumOff val="15000"/>
+                  </a:prstClr>
+                </a:solidFill>
+                <a:latin typeface="맑은 고딕" panose="020B0503020000020004" pitchFamily="50" charset="-127"/>
+                <a:ea typeface="맑은 고딕" panose="020B0503020000020004" pitchFamily="50" charset="-127"/>
+              </a:rPr>
+              <a:t>상위 서버는 하위 서버에게 직접</a:t>
+            </a:r>
+            <a:endParaRPr lang="en-US" altLang="ko-KR" sz="1400" dirty="0">
+              <a:solidFill>
+                <a:prstClr val="black">
+                  <a:lumMod val="85000"/>
+                  <a:lumOff val="15000"/>
+                </a:prstClr>
+              </a:solidFill>
+              <a:latin typeface="맑은 고딕" panose="020B0503020000020004" pitchFamily="50" charset="-127"/>
+              <a:ea typeface="맑은 고딕" panose="020B0503020000020004" pitchFamily="50" charset="-127"/>
+            </a:endParaRPr>
+          </a:p>
+          <a:p>
+            <a:pPr>
+              <a:spcAft>
+                <a:spcPts val="2200"/>
+              </a:spcAft>
+              <a:defRPr/>
+            </a:pPr>
+            <a:r>
+              <a:rPr lang="en-US" altLang="ko-KR" sz="1400" dirty="0">
+                <a:solidFill>
+                  <a:prstClr val="black">
+                    <a:lumMod val="85000"/>
+                    <a:lumOff val="15000"/>
+                  </a:prstClr>
+                </a:solidFill>
+                <a:latin typeface="맑은 고딕" panose="020B0503020000020004" pitchFamily="50" charset="-127"/>
+                <a:ea typeface="맑은 고딕" panose="020B0503020000020004" pitchFamily="50" charset="-127"/>
+              </a:rPr>
+              <a:t> Heartbeat</a:t>
+            </a:r>
+            <a:r>
+              <a:rPr lang="ko-KR" altLang="en-US" sz="1400" dirty="0">
+                <a:solidFill>
+                  <a:prstClr val="black">
+                    <a:lumMod val="85000"/>
+                    <a:lumOff val="15000"/>
+                  </a:prstClr>
+                </a:solidFill>
+                <a:latin typeface="맑은 고딕" panose="020B0503020000020004" pitchFamily="50" charset="-127"/>
+                <a:ea typeface="맑은 고딕" panose="020B0503020000020004" pitchFamily="50" charset="-127"/>
+              </a:rPr>
+              <a:t>를 보내고</a:t>
+            </a:r>
+            <a:r>
+              <a:rPr lang="en-US" altLang="ko-KR" sz="1400" dirty="0">
+                <a:solidFill>
+                  <a:prstClr val="black">
+                    <a:lumMod val="85000"/>
+                    <a:lumOff val="15000"/>
+                  </a:prstClr>
+                </a:solidFill>
+                <a:latin typeface="맑은 고딕" panose="020B0503020000020004" pitchFamily="50" charset="-127"/>
+                <a:ea typeface="맑은 고딕" panose="020B0503020000020004" pitchFamily="50" charset="-127"/>
+              </a:rPr>
+              <a:t> </a:t>
+            </a:r>
+            <a:r>
+              <a:rPr lang="ko-KR" altLang="en-US" sz="1400" dirty="0">
+                <a:solidFill>
+                  <a:prstClr val="black">
+                    <a:lumMod val="85000"/>
+                    <a:lumOff val="15000"/>
+                  </a:prstClr>
+                </a:solidFill>
+                <a:latin typeface="맑은 고딕" panose="020B0503020000020004" pitchFamily="50" charset="-127"/>
+                <a:ea typeface="맑은 고딕" panose="020B0503020000020004" pitchFamily="50" charset="-127"/>
+              </a:rPr>
+              <a:t>다시 </a:t>
+            </a:r>
+            <a:r>
+              <a:rPr lang="en-US" altLang="ko-KR" sz="1400" dirty="0">
+                <a:solidFill>
+                  <a:prstClr val="black">
+                    <a:lumMod val="85000"/>
+                    <a:lumOff val="15000"/>
+                  </a:prstClr>
+                </a:solidFill>
+                <a:latin typeface="맑은 고딕" panose="020B0503020000020004" pitchFamily="50" charset="-127"/>
+                <a:ea typeface="맑은 고딕" panose="020B0503020000020004" pitchFamily="50" charset="-127"/>
+              </a:rPr>
+              <a:t>Heartbeat</a:t>
+            </a:r>
+            <a:r>
+              <a:rPr lang="ko-KR" altLang="en-US" sz="1400" dirty="0">
+                <a:solidFill>
+                  <a:prstClr val="black">
+                    <a:lumMod val="85000"/>
+                    <a:lumOff val="15000"/>
+                  </a:prstClr>
+                </a:solidFill>
+                <a:latin typeface="맑은 고딕" panose="020B0503020000020004" pitchFamily="50" charset="-127"/>
+                <a:ea typeface="맑은 고딕" panose="020B0503020000020004" pitchFamily="50" charset="-127"/>
+              </a:rPr>
+              <a:t>가 돌아오는 지를 확인합니다</a:t>
+            </a:r>
+            <a:r>
+              <a:rPr lang="en-US" altLang="ko-KR" sz="1400" dirty="0">
+                <a:solidFill>
+                  <a:prstClr val="black">
+                    <a:lumMod val="85000"/>
+                    <a:lumOff val="15000"/>
+                  </a:prstClr>
+                </a:solidFill>
+                <a:latin typeface="맑은 고딕" panose="020B0503020000020004" pitchFamily="50" charset="-127"/>
+                <a:ea typeface="맑은 고딕" panose="020B0503020000020004" pitchFamily="50" charset="-127"/>
+              </a:rPr>
+              <a:t>.</a:t>
+            </a:r>
+          </a:p>
+          <a:p>
+            <a:pPr>
+              <a:spcAft>
+                <a:spcPts val="2200"/>
+              </a:spcAft>
+              <a:defRPr/>
+            </a:pPr>
+            <a:endParaRPr lang="en-US" altLang="ko-KR" sz="1400" dirty="0">
+              <a:solidFill>
+                <a:prstClr val="black">
+                  <a:lumMod val="85000"/>
+                  <a:lumOff val="15000"/>
+                </a:prstClr>
+              </a:solidFill>
+              <a:latin typeface="맑은 고딕" panose="020B0503020000020004" pitchFamily="50" charset="-127"/>
+              <a:ea typeface="맑은 고딕" panose="020B0503020000020004" pitchFamily="50" charset="-127"/>
+            </a:endParaRPr>
+          </a:p>
+          <a:p>
+            <a:pPr>
+              <a:spcAft>
+                <a:spcPts val="2200"/>
+              </a:spcAft>
+              <a:defRPr/>
+            </a:pPr>
+            <a:r>
+              <a:rPr lang="en-US" altLang="ko-KR" sz="1800" dirty="0">
+                <a:solidFill>
+                  <a:prstClr val="black">
+                    <a:lumMod val="85000"/>
+                    <a:lumOff val="15000"/>
+                  </a:prstClr>
+                </a:solidFill>
+                <a:latin typeface="맑은 고딕" panose="020B0503020000020004" pitchFamily="50" charset="-127"/>
+                <a:ea typeface="맑은 고딕" panose="020B0503020000020004" pitchFamily="50" charset="-127"/>
+              </a:rPr>
+              <a:t>1. </a:t>
+            </a:r>
+            <a:r>
+              <a:rPr lang="ko-KR" altLang="en-US" sz="1800" dirty="0">
+                <a:solidFill>
+                  <a:prstClr val="black">
+                    <a:lumMod val="85000"/>
+                    <a:lumOff val="15000"/>
+                  </a:prstClr>
+                </a:solidFill>
+                <a:latin typeface="맑은 고딕" panose="020B0503020000020004" pitchFamily="50" charset="-127"/>
+                <a:ea typeface="맑은 고딕" panose="020B0503020000020004" pitchFamily="50" charset="-127"/>
+              </a:rPr>
+              <a:t>실제로 서버 다운이 확인됨</a:t>
+            </a:r>
+            <a:r>
+              <a:rPr lang="en-US" altLang="ko-KR" sz="1800" dirty="0">
+                <a:solidFill>
+                  <a:prstClr val="black">
+                    <a:lumMod val="85000"/>
+                    <a:lumOff val="15000"/>
+                  </a:prstClr>
+                </a:solidFill>
+                <a:latin typeface="맑은 고딕" panose="020B0503020000020004" pitchFamily="50" charset="-127"/>
+                <a:ea typeface="맑은 고딕" panose="020B0503020000020004" pitchFamily="50" charset="-127"/>
+              </a:rPr>
+              <a:t>.</a:t>
+            </a:r>
+          </a:p>
+          <a:p>
+            <a:pPr>
+              <a:spcAft>
+                <a:spcPts val="2200"/>
+              </a:spcAft>
+              <a:defRPr/>
+            </a:pPr>
+            <a:r>
+              <a:rPr lang="en-US" altLang="ko-KR" sz="1400" dirty="0">
+                <a:solidFill>
+                  <a:prstClr val="black">
+                    <a:lumMod val="85000"/>
+                    <a:lumOff val="15000"/>
+                  </a:prstClr>
+                </a:solidFill>
+                <a:latin typeface="맑은 고딕" panose="020B0503020000020004" pitchFamily="50" charset="-127"/>
+                <a:ea typeface="맑은 고딕" panose="020B0503020000020004" pitchFamily="50" charset="-127"/>
+              </a:rPr>
+              <a:t> </a:t>
+            </a:r>
+            <a:r>
+              <a:rPr lang="en-US" altLang="ko-KR" sz="1400">
+                <a:solidFill>
+                  <a:prstClr val="black">
+                    <a:lumMod val="85000"/>
+                    <a:lumOff val="15000"/>
+                  </a:prstClr>
+                </a:solidFill>
+                <a:latin typeface="맑은 고딕" panose="020B0503020000020004" pitchFamily="50" charset="-127"/>
+                <a:ea typeface="맑은 고딕" panose="020B0503020000020004" pitchFamily="50" charset="-127"/>
+              </a:rPr>
+              <a:t>: </a:t>
+            </a:r>
+            <a:r>
+              <a:rPr lang="ko-KR" altLang="en-US" sz="1400">
+                <a:solidFill>
+                  <a:prstClr val="black">
+                    <a:lumMod val="85000"/>
+                    <a:lumOff val="15000"/>
+                  </a:prstClr>
+                </a:solidFill>
+                <a:latin typeface="맑은 고딕" panose="020B0503020000020004" pitchFamily="50" charset="-127"/>
+                <a:ea typeface="맑은 고딕" panose="020B0503020000020004" pitchFamily="50" charset="-127"/>
+              </a:rPr>
+              <a:t>이전 </a:t>
+            </a:r>
+            <a:r>
+              <a:rPr lang="ko-KR" altLang="en-US" sz="1400" dirty="0">
+                <a:solidFill>
+                  <a:prstClr val="black">
+                    <a:lumMod val="85000"/>
+                    <a:lumOff val="15000"/>
+                  </a:prstClr>
+                </a:solidFill>
+                <a:latin typeface="맑은 고딕" panose="020B0503020000020004" pitchFamily="50" charset="-127"/>
+                <a:ea typeface="맑은 고딕" panose="020B0503020000020004" pitchFamily="50" charset="-127"/>
+              </a:rPr>
+              <a:t>슬라이드에서 말씀드린 시나리오대로 </a:t>
+            </a:r>
+            <a:r>
+              <a:rPr lang="en-US" altLang="ko-KR" sz="1400" dirty="0">
+                <a:solidFill>
+                  <a:prstClr val="black">
+                    <a:lumMod val="85000"/>
+                    <a:lumOff val="15000"/>
+                  </a:prstClr>
+                </a:solidFill>
+                <a:latin typeface="맑은 고딕" panose="020B0503020000020004" pitchFamily="50" charset="-127"/>
+                <a:ea typeface="맑은 고딕" panose="020B0503020000020004" pitchFamily="50" charset="-127"/>
+              </a:rPr>
+              <a:t>Failover</a:t>
+            </a:r>
+            <a:r>
+              <a:rPr lang="ko-KR" altLang="en-US" sz="1400" dirty="0">
+                <a:solidFill>
+                  <a:prstClr val="black">
+                    <a:lumMod val="85000"/>
+                    <a:lumOff val="15000"/>
+                  </a:prstClr>
+                </a:solidFill>
+                <a:latin typeface="맑은 고딕" panose="020B0503020000020004" pitchFamily="50" charset="-127"/>
+                <a:ea typeface="맑은 고딕" panose="020B0503020000020004" pitchFamily="50" charset="-127"/>
+              </a:rPr>
+              <a:t>를 진행합니다</a:t>
+            </a:r>
+            <a:r>
+              <a:rPr lang="en-US" altLang="ko-KR" sz="1400" dirty="0">
+                <a:solidFill>
+                  <a:prstClr val="black">
+                    <a:lumMod val="85000"/>
+                    <a:lumOff val="15000"/>
+                  </a:prstClr>
+                </a:solidFill>
+                <a:latin typeface="맑은 고딕" panose="020B0503020000020004" pitchFamily="50" charset="-127"/>
+                <a:ea typeface="맑은 고딕" panose="020B0503020000020004" pitchFamily="50" charset="-127"/>
+              </a:rPr>
+              <a:t>.</a:t>
+            </a:r>
+          </a:p>
+          <a:p>
+            <a:pPr>
+              <a:spcAft>
+                <a:spcPts val="2200"/>
+              </a:spcAft>
+              <a:defRPr/>
+            </a:pPr>
+            <a:r>
+              <a:rPr lang="en-US" altLang="ko-KR" sz="1600" dirty="0">
+                <a:solidFill>
+                  <a:prstClr val="black">
+                    <a:lumMod val="85000"/>
+                    <a:lumOff val="15000"/>
+                  </a:prstClr>
+                </a:solidFill>
+                <a:latin typeface="맑은 고딕" panose="020B0503020000020004" pitchFamily="50" charset="-127"/>
+                <a:ea typeface="맑은 고딕" panose="020B0503020000020004" pitchFamily="50" charset="-127"/>
+              </a:rPr>
+              <a:t>2. </a:t>
+            </a:r>
+            <a:r>
+              <a:rPr lang="ko-KR" altLang="en-US" sz="1600" dirty="0">
+                <a:solidFill>
+                  <a:prstClr val="black">
+                    <a:lumMod val="85000"/>
+                    <a:lumOff val="15000"/>
+                  </a:prstClr>
+                </a:solidFill>
+                <a:latin typeface="맑은 고딕" panose="020B0503020000020004" pitchFamily="50" charset="-127"/>
+                <a:ea typeface="맑은 고딕" panose="020B0503020000020004" pitchFamily="50" charset="-127"/>
+              </a:rPr>
+              <a:t>하위 서버가 잘 살아있음</a:t>
+            </a:r>
+            <a:r>
+              <a:rPr lang="en-US" altLang="ko-KR" sz="1600" dirty="0">
+                <a:solidFill>
+                  <a:prstClr val="black">
+                    <a:lumMod val="85000"/>
+                    <a:lumOff val="15000"/>
+                  </a:prstClr>
+                </a:solidFill>
+                <a:latin typeface="맑은 고딕" panose="020B0503020000020004" pitchFamily="50" charset="-127"/>
+                <a:ea typeface="맑은 고딕" panose="020B0503020000020004" pitchFamily="50" charset="-127"/>
+              </a:rPr>
+              <a:t>.</a:t>
+            </a:r>
+          </a:p>
+          <a:p>
+            <a:pPr>
+              <a:spcAft>
+                <a:spcPts val="2200"/>
+              </a:spcAft>
+              <a:defRPr/>
+            </a:pPr>
+            <a:r>
+              <a:rPr lang="en-US" altLang="ko-KR" sz="1400" dirty="0">
+                <a:solidFill>
+                  <a:prstClr val="black">
+                    <a:lumMod val="85000"/>
+                    <a:lumOff val="15000"/>
+                  </a:prstClr>
+                </a:solidFill>
+                <a:latin typeface="맑은 고딕" panose="020B0503020000020004" pitchFamily="50" charset="-127"/>
+                <a:ea typeface="맑은 고딕" panose="020B0503020000020004" pitchFamily="50" charset="-127"/>
+              </a:rPr>
+              <a:t> : </a:t>
+            </a:r>
+            <a:r>
+              <a:rPr lang="ko-KR" altLang="en-US" sz="1400" dirty="0">
+                <a:solidFill>
+                  <a:prstClr val="black">
+                    <a:lumMod val="85000"/>
+                    <a:lumOff val="15000"/>
+                  </a:prstClr>
+                </a:solidFill>
+                <a:latin typeface="맑은 고딕" panose="020B0503020000020004" pitchFamily="50" charset="-127"/>
+                <a:ea typeface="맑은 고딕" panose="020B0503020000020004" pitchFamily="50" charset="-127"/>
+              </a:rPr>
+              <a:t>상위 서버는</a:t>
+            </a:r>
+            <a:r>
+              <a:rPr lang="en-US" altLang="ko-KR" sz="1400" dirty="0">
+                <a:solidFill>
+                  <a:prstClr val="black">
+                    <a:lumMod val="85000"/>
+                    <a:lumOff val="15000"/>
+                  </a:prstClr>
+                </a:solidFill>
+                <a:latin typeface="맑은 고딕" panose="020B0503020000020004" pitchFamily="50" charset="-127"/>
+                <a:ea typeface="맑은 고딕" panose="020B0503020000020004" pitchFamily="50" charset="-127"/>
+              </a:rPr>
+              <a:t> </a:t>
+            </a:r>
+            <a:r>
+              <a:rPr lang="ko-KR" altLang="en-US" sz="1400" dirty="0">
+                <a:solidFill>
+                  <a:prstClr val="black">
+                    <a:lumMod val="85000"/>
+                    <a:lumOff val="15000"/>
+                  </a:prstClr>
+                </a:solidFill>
+                <a:latin typeface="맑은 고딕" panose="020B0503020000020004" pitchFamily="50" charset="-127"/>
+                <a:ea typeface="맑은 고딕" panose="020B0503020000020004" pitchFamily="50" charset="-127"/>
+              </a:rPr>
+              <a:t>서버 간 통신이 끊어진 경우로 판단하여</a:t>
+            </a:r>
+            <a:endParaRPr lang="en-US" altLang="ko-KR" sz="1400" dirty="0">
+              <a:solidFill>
+                <a:prstClr val="black">
+                  <a:lumMod val="85000"/>
+                  <a:lumOff val="15000"/>
+                </a:prstClr>
+              </a:solidFill>
+              <a:latin typeface="맑은 고딕" panose="020B0503020000020004" pitchFamily="50" charset="-127"/>
+              <a:ea typeface="맑은 고딕" panose="020B0503020000020004" pitchFamily="50" charset="-127"/>
+            </a:endParaRPr>
+          </a:p>
+          <a:p>
+            <a:pPr>
+              <a:spcAft>
+                <a:spcPts val="2200"/>
+              </a:spcAft>
+              <a:defRPr/>
+            </a:pPr>
+            <a:r>
+              <a:rPr lang="ko-KR" altLang="en-US" sz="1400" dirty="0">
+                <a:solidFill>
+                  <a:prstClr val="black">
+                    <a:lumMod val="85000"/>
+                    <a:lumOff val="15000"/>
+                  </a:prstClr>
+                </a:solidFill>
+                <a:latin typeface="맑은 고딕" panose="020B0503020000020004" pitchFamily="50" charset="-127"/>
+                <a:ea typeface="맑은 고딕" panose="020B0503020000020004" pitchFamily="50" charset="-127"/>
+              </a:rPr>
+              <a:t> 개발자에게 수동으로 서버 간 네트워크 복구를 진행할 수 있도록</a:t>
+            </a:r>
+            <a:endParaRPr lang="en-US" altLang="ko-KR" sz="1400" dirty="0">
+              <a:solidFill>
+                <a:prstClr val="black">
+                  <a:lumMod val="85000"/>
+                  <a:lumOff val="15000"/>
+                </a:prstClr>
+              </a:solidFill>
+              <a:latin typeface="맑은 고딕" panose="020B0503020000020004" pitchFamily="50" charset="-127"/>
+              <a:ea typeface="맑은 고딕" panose="020B0503020000020004" pitchFamily="50" charset="-127"/>
+            </a:endParaRPr>
+          </a:p>
+          <a:p>
+            <a:pPr>
+              <a:spcAft>
+                <a:spcPts val="2200"/>
+              </a:spcAft>
+              <a:defRPr/>
+            </a:pPr>
+            <a:r>
+              <a:rPr lang="ko-KR" altLang="en-US" sz="1400" dirty="0">
+                <a:solidFill>
+                  <a:prstClr val="black">
+                    <a:lumMod val="85000"/>
+                    <a:lumOff val="15000"/>
+                  </a:prstClr>
+                </a:solidFill>
+                <a:latin typeface="맑은 고딕" panose="020B0503020000020004" pitchFamily="50" charset="-127"/>
+                <a:ea typeface="맑은 고딕" panose="020B0503020000020004" pitchFamily="50" charset="-127"/>
+              </a:rPr>
+              <a:t> 서버 간 네트워크 장애에 대한</a:t>
+            </a:r>
+            <a:r>
+              <a:rPr lang="en-US" altLang="ko-KR" sz="1400" dirty="0">
+                <a:solidFill>
+                  <a:prstClr val="black">
+                    <a:lumMod val="85000"/>
+                    <a:lumOff val="15000"/>
+                  </a:prstClr>
+                </a:solidFill>
+                <a:latin typeface="맑은 고딕" panose="020B0503020000020004" pitchFamily="50" charset="-127"/>
+                <a:ea typeface="맑은 고딕" panose="020B0503020000020004" pitchFamily="50" charset="-127"/>
+              </a:rPr>
+              <a:t> </a:t>
+            </a:r>
+            <a:r>
+              <a:rPr lang="ko-KR" altLang="en-US" sz="1400" dirty="0">
+                <a:solidFill>
+                  <a:prstClr val="black">
+                    <a:lumMod val="85000"/>
+                    <a:lumOff val="15000"/>
+                  </a:prstClr>
+                </a:solidFill>
+                <a:latin typeface="맑은 고딕" panose="020B0503020000020004" pitchFamily="50" charset="-127"/>
+                <a:ea typeface="맑은 고딕" panose="020B0503020000020004" pitchFamily="50" charset="-127"/>
+              </a:rPr>
+              <a:t>사실을 알려주도록 합니다</a:t>
+            </a:r>
+            <a:r>
+              <a:rPr lang="en-US" altLang="ko-KR" sz="1400" dirty="0">
+                <a:solidFill>
+                  <a:prstClr val="black">
+                    <a:lumMod val="85000"/>
+                    <a:lumOff val="15000"/>
+                  </a:prstClr>
+                </a:solidFill>
+                <a:latin typeface="맑은 고딕" panose="020B0503020000020004" pitchFamily="50" charset="-127"/>
+                <a:ea typeface="맑은 고딕" panose="020B0503020000020004" pitchFamily="50" charset="-127"/>
+              </a:rPr>
+              <a:t>.</a:t>
+            </a:r>
+          </a:p>
+        </p:txBody>
+      </p:sp>
+      <p:cxnSp>
+        <p:nvCxnSpPr>
+          <p:cNvPr id="37" name="직선 화살표 연결선 36">
+            <a:extLst>
+              <a:ext uri="{FF2B5EF4-FFF2-40B4-BE49-F238E27FC236}">
+                <a16:creationId xmlns:a16="http://schemas.microsoft.com/office/drawing/2014/main" id="{AA6CC00F-71B6-BC5A-CB99-3ED5EF1CB0FA}"/>
+              </a:ext>
+            </a:extLst>
+          </p:cNvPr>
+          <p:cNvCxnSpPr>
+            <a:cxnSpLocks/>
+          </p:cNvCxnSpPr>
+          <p:nvPr/>
+        </p:nvCxnSpPr>
+        <p:spPr>
+          <a:xfrm flipH="1">
+            <a:off x="8180230" y="2393079"/>
+            <a:ext cx="1623831" cy="0"/>
+          </a:xfrm>
+          <a:prstGeom prst="straightConnector1">
+            <a:avLst/>
+          </a:prstGeom>
+          <a:ln w="28575">
+            <a:solidFill>
+              <a:srgbClr val="FF0000"/>
+            </a:solidFill>
+            <a:tailEnd type="triangle"/>
+          </a:ln>
+        </p:spPr>
+        <p:style>
+          <a:lnRef idx="1">
+            <a:schemeClr val="accent1"/>
+          </a:lnRef>
+          <a:fillRef idx="0">
+            <a:schemeClr val="accent1"/>
+          </a:fillRef>
+          <a:effectRef idx="0">
+            <a:schemeClr val="accent1"/>
+          </a:effectRef>
+          <a:fontRef idx="minor">
+            <a:schemeClr val="tx1"/>
+          </a:fontRef>
+        </p:style>
+      </p:cxnSp>
+      <p:cxnSp>
+        <p:nvCxnSpPr>
+          <p:cNvPr id="38" name="직선 화살표 연결선 37">
+            <a:extLst>
+              <a:ext uri="{FF2B5EF4-FFF2-40B4-BE49-F238E27FC236}">
+                <a16:creationId xmlns:a16="http://schemas.microsoft.com/office/drawing/2014/main" id="{5ACE4E44-46C4-0226-B7F7-87620A42A272}"/>
+              </a:ext>
+            </a:extLst>
+          </p:cNvPr>
+          <p:cNvCxnSpPr>
+            <a:cxnSpLocks/>
+          </p:cNvCxnSpPr>
+          <p:nvPr/>
+        </p:nvCxnSpPr>
+        <p:spPr>
+          <a:xfrm>
+            <a:off x="8234141" y="2671566"/>
+            <a:ext cx="1569920" cy="0"/>
+          </a:xfrm>
+          <a:prstGeom prst="straightConnector1">
+            <a:avLst/>
+          </a:prstGeom>
+          <a:ln w="28575">
+            <a:solidFill>
+              <a:srgbClr val="FF0000"/>
+            </a:solidFill>
+            <a:tailEnd type="triangle"/>
+          </a:ln>
+        </p:spPr>
+        <p:style>
+          <a:lnRef idx="1">
+            <a:schemeClr val="accent1"/>
+          </a:lnRef>
+          <a:fillRef idx="0">
+            <a:schemeClr val="accent1"/>
+          </a:fillRef>
+          <a:effectRef idx="0">
+            <a:schemeClr val="accent1"/>
+          </a:effectRef>
+          <a:fontRef idx="minor">
+            <a:schemeClr val="tx1"/>
+          </a:fontRef>
+        </p:style>
+      </p:cxnSp>
+      <p:sp>
+        <p:nvSpPr>
+          <p:cNvPr id="39" name="곱하기 기호 38">
+            <a:extLst>
+              <a:ext uri="{FF2B5EF4-FFF2-40B4-BE49-F238E27FC236}">
+                <a16:creationId xmlns:a16="http://schemas.microsoft.com/office/drawing/2014/main" id="{D0DE8B80-B771-B009-B69F-21CC5F67A127}"/>
+              </a:ext>
+            </a:extLst>
+          </p:cNvPr>
+          <p:cNvSpPr/>
+          <p:nvPr/>
+        </p:nvSpPr>
+        <p:spPr>
+          <a:xfrm>
+            <a:off x="8758385" y="2041094"/>
+            <a:ext cx="448573" cy="954818"/>
+          </a:xfrm>
+          <a:prstGeom prst="mathMultiply">
+            <a:avLst/>
+          </a:prstGeom>
+          <a:solidFill>
+            <a:srgbClr val="FF0000"/>
+          </a:solidFill>
+          <a:ln>
+            <a:noFill/>
+          </a:ln>
+        </p:spPr>
+        <p:style>
+          <a:lnRef idx="2">
+            <a:schemeClr val="accent1">
+              <a:shade val="50000"/>
+            </a:schemeClr>
+          </a:lnRef>
+          <a:fillRef idx="1">
+            <a:schemeClr val="accent1"/>
+          </a:fillRef>
+          <a:effectRef idx="0">
+            <a:schemeClr val="accent1"/>
+          </a:effectRef>
+          <a:fontRef idx="minor">
+            <a:schemeClr val="lt1"/>
+          </a:fontRef>
+        </p:style>
+        <p:txBody>
+          <a:bodyPr rtlCol="0" anchor="ctr"/>
+          <a:lstStyle/>
+          <a:p>
+            <a:pPr algn="ctr"/>
+            <a:endParaRPr lang="ko-KR" altLang="en-US"/>
+          </a:p>
+        </p:txBody>
+      </p:sp>
+      <p:sp>
+        <p:nvSpPr>
+          <p:cNvPr id="7" name="TextBox 6">
+            <a:extLst>
+              <a:ext uri="{FF2B5EF4-FFF2-40B4-BE49-F238E27FC236}">
+                <a16:creationId xmlns:a16="http://schemas.microsoft.com/office/drawing/2014/main" id="{B75C58FC-8ED8-D243-8482-6C7E8BA362B1}"/>
+              </a:ext>
+            </a:extLst>
+          </p:cNvPr>
+          <p:cNvSpPr txBox="1"/>
+          <p:nvPr/>
+        </p:nvSpPr>
+        <p:spPr>
+          <a:xfrm>
+            <a:off x="8148377" y="2839109"/>
+            <a:ext cx="1770195" cy="307777"/>
+          </a:xfrm>
+          <a:prstGeom prst="rect">
+            <a:avLst/>
+          </a:prstGeom>
+          <a:noFill/>
+        </p:spPr>
+        <p:txBody>
+          <a:bodyPr wrap="square" rtlCol="0">
+            <a:spAutoFit/>
+          </a:bodyPr>
+          <a:lstStyle/>
+          <a:p>
+            <a:r>
+              <a:rPr lang="ko-KR" altLang="en-US" sz="1400" b="1" dirty="0"/>
+              <a:t>① </a:t>
+            </a:r>
+            <a:r>
+              <a:rPr lang="ko-KR" altLang="en-US" sz="1200" dirty="0"/>
+              <a:t>서버간 통신 단절</a:t>
+            </a:r>
+            <a:endParaRPr lang="ko-KR" altLang="en-US" sz="1600" dirty="0"/>
+          </a:p>
+        </p:txBody>
+      </p:sp>
+      <p:sp>
+        <p:nvSpPr>
+          <p:cNvPr id="9" name="TextBox 8">
+            <a:extLst>
+              <a:ext uri="{FF2B5EF4-FFF2-40B4-BE49-F238E27FC236}">
+                <a16:creationId xmlns:a16="http://schemas.microsoft.com/office/drawing/2014/main" id="{4C2CFBC2-5BEB-A5C2-C178-75C9C243A75C}"/>
+              </a:ext>
+            </a:extLst>
+          </p:cNvPr>
+          <p:cNvSpPr txBox="1"/>
+          <p:nvPr/>
+        </p:nvSpPr>
+        <p:spPr>
+          <a:xfrm>
+            <a:off x="9735421" y="1139345"/>
+            <a:ext cx="1785559" cy="492443"/>
+          </a:xfrm>
+          <a:prstGeom prst="rect">
+            <a:avLst/>
+          </a:prstGeom>
+          <a:noFill/>
+        </p:spPr>
+        <p:txBody>
+          <a:bodyPr wrap="square" rtlCol="0">
+            <a:spAutoFit/>
+          </a:bodyPr>
+          <a:lstStyle/>
+          <a:p>
+            <a:r>
+              <a:rPr lang="ko-KR" altLang="en-US" sz="1400" b="1" dirty="0"/>
+              <a:t>② </a:t>
+            </a:r>
+            <a:r>
+              <a:rPr lang="en-US" altLang="ko-KR" sz="1200" dirty="0"/>
+              <a:t>Active</a:t>
+            </a:r>
+            <a:r>
+              <a:rPr lang="ko-KR" altLang="en-US" sz="1200" dirty="0"/>
+              <a:t>서버가</a:t>
+            </a:r>
+            <a:endParaRPr lang="en-US" altLang="ko-KR" sz="1200" dirty="0"/>
+          </a:p>
+          <a:p>
+            <a:r>
+              <a:rPr lang="en-US" altLang="ko-KR" sz="1200" dirty="0"/>
+              <a:t>    </a:t>
+            </a:r>
+            <a:r>
+              <a:rPr lang="ko-KR" altLang="en-US" sz="1200" dirty="0"/>
+              <a:t>다운되었다고 알림</a:t>
+            </a:r>
+            <a:endParaRPr lang="ko-KR" altLang="en-US" dirty="0"/>
+          </a:p>
+        </p:txBody>
+      </p:sp>
+      <p:pic>
+        <p:nvPicPr>
+          <p:cNvPr id="12" name="그림 11">
+            <a:extLst>
+              <a:ext uri="{FF2B5EF4-FFF2-40B4-BE49-F238E27FC236}">
+                <a16:creationId xmlns:a16="http://schemas.microsoft.com/office/drawing/2014/main" id="{E281FF19-09FB-F434-99F3-CB16BA2C538E}"/>
+              </a:ext>
+            </a:extLst>
+          </p:cNvPr>
+          <p:cNvPicPr>
+            <a:picLocks noChangeAspect="1"/>
+          </p:cNvPicPr>
+          <p:nvPr/>
+        </p:nvPicPr>
+        <p:blipFill>
+          <a:blip r:embed="rId3"/>
+          <a:stretch>
+            <a:fillRect/>
+          </a:stretch>
+        </p:blipFill>
+        <p:spPr>
+          <a:xfrm>
+            <a:off x="7307028" y="2093825"/>
+            <a:ext cx="561975" cy="1162050"/>
+          </a:xfrm>
+          <a:prstGeom prst="rect">
+            <a:avLst/>
+          </a:prstGeom>
+        </p:spPr>
+      </p:pic>
+      <p:pic>
+        <p:nvPicPr>
+          <p:cNvPr id="14" name="그림 13">
+            <a:extLst>
+              <a:ext uri="{FF2B5EF4-FFF2-40B4-BE49-F238E27FC236}">
+                <a16:creationId xmlns:a16="http://schemas.microsoft.com/office/drawing/2014/main" id="{727B9826-FB08-B5CA-75AD-03C83265E196}"/>
+              </a:ext>
+            </a:extLst>
+          </p:cNvPr>
+          <p:cNvPicPr>
+            <a:picLocks noChangeAspect="1"/>
+          </p:cNvPicPr>
+          <p:nvPr/>
+        </p:nvPicPr>
+        <p:blipFill>
+          <a:blip r:embed="rId3"/>
+          <a:stretch>
+            <a:fillRect/>
+          </a:stretch>
+        </p:blipFill>
+        <p:spPr>
+          <a:xfrm>
+            <a:off x="10167269" y="2093825"/>
+            <a:ext cx="561975" cy="1162050"/>
+          </a:xfrm>
+          <a:prstGeom prst="rect">
+            <a:avLst/>
+          </a:prstGeom>
+        </p:spPr>
+      </p:pic>
+      <p:sp>
+        <p:nvSpPr>
+          <p:cNvPr id="46" name="TextBox 45">
+            <a:extLst>
+              <a:ext uri="{FF2B5EF4-FFF2-40B4-BE49-F238E27FC236}">
+                <a16:creationId xmlns:a16="http://schemas.microsoft.com/office/drawing/2014/main" id="{FCC8AE71-3F0E-3F6A-F99F-68C086EA8DFF}"/>
+              </a:ext>
+            </a:extLst>
+          </p:cNvPr>
+          <p:cNvSpPr txBox="1"/>
+          <p:nvPr/>
+        </p:nvSpPr>
+        <p:spPr>
+          <a:xfrm>
+            <a:off x="10066544" y="1931469"/>
+            <a:ext cx="813097" cy="276999"/>
+          </a:xfrm>
+          <a:prstGeom prst="rect">
+            <a:avLst/>
+          </a:prstGeom>
+          <a:noFill/>
+        </p:spPr>
+        <p:txBody>
+          <a:bodyPr wrap="square">
+            <a:spAutoFit/>
+          </a:bodyPr>
+          <a:lstStyle/>
+          <a:p>
+            <a:r>
+              <a:rPr lang="en-US" altLang="ko-KR" sz="1200" dirty="0"/>
+              <a:t>Standby</a:t>
+            </a:r>
+            <a:endParaRPr lang="ko-KR" altLang="en-US" sz="1200" dirty="0"/>
+          </a:p>
+        </p:txBody>
+      </p:sp>
+      <p:sp>
+        <p:nvSpPr>
+          <p:cNvPr id="45" name="TextBox 44">
+            <a:extLst>
+              <a:ext uri="{FF2B5EF4-FFF2-40B4-BE49-F238E27FC236}">
+                <a16:creationId xmlns:a16="http://schemas.microsoft.com/office/drawing/2014/main" id="{0378108E-F299-07A5-AF56-7639DD033BA0}"/>
+              </a:ext>
+            </a:extLst>
+          </p:cNvPr>
+          <p:cNvSpPr txBox="1"/>
+          <p:nvPr/>
+        </p:nvSpPr>
+        <p:spPr>
+          <a:xfrm>
+            <a:off x="7278590" y="1926132"/>
+            <a:ext cx="958250" cy="276999"/>
+          </a:xfrm>
+          <a:prstGeom prst="rect">
+            <a:avLst/>
+          </a:prstGeom>
+          <a:noFill/>
+        </p:spPr>
+        <p:txBody>
+          <a:bodyPr wrap="square">
+            <a:spAutoFit/>
+          </a:bodyPr>
+          <a:lstStyle/>
+          <a:p>
+            <a:r>
+              <a:rPr lang="en-US" altLang="ko-KR" sz="1200" dirty="0">
+                <a:solidFill>
+                  <a:prstClr val="black">
+                    <a:lumMod val="85000"/>
+                    <a:lumOff val="15000"/>
+                  </a:prstClr>
+                </a:solidFill>
+                <a:latin typeface="맑은 고딕" panose="020B0503020000020004" pitchFamily="50" charset="-127"/>
+                <a:ea typeface="맑은 고딕" panose="020B0503020000020004" pitchFamily="50" charset="-127"/>
+              </a:rPr>
+              <a:t>Active</a:t>
+            </a:r>
+            <a:endParaRPr lang="ko-KR" altLang="en-US" sz="1200" dirty="0"/>
+          </a:p>
+        </p:txBody>
+      </p:sp>
+      <p:pic>
+        <p:nvPicPr>
+          <p:cNvPr id="17" name="그림 16">
+            <a:extLst>
+              <a:ext uri="{FF2B5EF4-FFF2-40B4-BE49-F238E27FC236}">
+                <a16:creationId xmlns:a16="http://schemas.microsoft.com/office/drawing/2014/main" id="{E90F41CD-7B60-8024-98E1-2433D187BB73}"/>
+              </a:ext>
+            </a:extLst>
+          </p:cNvPr>
+          <p:cNvPicPr>
+            <a:picLocks noChangeAspect="1"/>
+          </p:cNvPicPr>
+          <p:nvPr/>
+        </p:nvPicPr>
+        <p:blipFill>
+          <a:blip r:embed="rId4"/>
+          <a:stretch>
+            <a:fillRect/>
+          </a:stretch>
+        </p:blipFill>
+        <p:spPr>
+          <a:xfrm>
+            <a:off x="8430221" y="427705"/>
+            <a:ext cx="1104900" cy="1295400"/>
+          </a:xfrm>
+          <a:prstGeom prst="rect">
+            <a:avLst/>
+          </a:prstGeom>
+        </p:spPr>
+      </p:pic>
+      <p:cxnSp>
+        <p:nvCxnSpPr>
+          <p:cNvPr id="34" name="직선 연결선 33">
+            <a:extLst>
+              <a:ext uri="{FF2B5EF4-FFF2-40B4-BE49-F238E27FC236}">
+                <a16:creationId xmlns:a16="http://schemas.microsoft.com/office/drawing/2014/main" id="{9176485D-07F9-7156-F3AF-6724B1CAF6F0}"/>
+              </a:ext>
+            </a:extLst>
+          </p:cNvPr>
+          <p:cNvCxnSpPr>
+            <a:cxnSpLocks/>
+          </p:cNvCxnSpPr>
+          <p:nvPr/>
+        </p:nvCxnSpPr>
+        <p:spPr>
+          <a:xfrm flipV="1">
+            <a:off x="7846971" y="1495590"/>
+            <a:ext cx="608694" cy="501489"/>
+          </a:xfrm>
+          <a:prstGeom prst="line">
+            <a:avLst/>
+          </a:prstGeom>
+        </p:spPr>
+        <p:style>
+          <a:lnRef idx="1">
+            <a:schemeClr val="dk1"/>
+          </a:lnRef>
+          <a:fillRef idx="0">
+            <a:schemeClr val="dk1"/>
+          </a:fillRef>
+          <a:effectRef idx="0">
+            <a:schemeClr val="dk1"/>
+          </a:effectRef>
+          <a:fontRef idx="minor">
+            <a:schemeClr val="tx1"/>
+          </a:fontRef>
+        </p:style>
+      </p:cxnSp>
+      <p:cxnSp>
+        <p:nvCxnSpPr>
+          <p:cNvPr id="35" name="직선 연결선 34">
+            <a:extLst>
+              <a:ext uri="{FF2B5EF4-FFF2-40B4-BE49-F238E27FC236}">
+                <a16:creationId xmlns:a16="http://schemas.microsoft.com/office/drawing/2014/main" id="{0467F6D9-1C44-3047-3FE0-1D44A8DB49FB}"/>
+              </a:ext>
+            </a:extLst>
+          </p:cNvPr>
+          <p:cNvCxnSpPr>
+            <a:cxnSpLocks/>
+          </p:cNvCxnSpPr>
+          <p:nvPr/>
+        </p:nvCxnSpPr>
+        <p:spPr>
+          <a:xfrm flipH="1" flipV="1">
+            <a:off x="9410927" y="1487290"/>
+            <a:ext cx="608694" cy="501489"/>
+          </a:xfrm>
+          <a:prstGeom prst="line">
+            <a:avLst/>
+          </a:prstGeom>
+        </p:spPr>
+        <p:style>
+          <a:lnRef idx="1">
+            <a:schemeClr val="dk1"/>
+          </a:lnRef>
+          <a:fillRef idx="0">
+            <a:schemeClr val="dk1"/>
+          </a:fillRef>
+          <a:effectRef idx="0">
+            <a:schemeClr val="dk1"/>
+          </a:effectRef>
+          <a:fontRef idx="minor">
+            <a:schemeClr val="tx1"/>
+          </a:fontRef>
+        </p:style>
+      </p:cxnSp>
+      <p:cxnSp>
+        <p:nvCxnSpPr>
+          <p:cNvPr id="41" name="직선 화살표 연결선 40">
+            <a:extLst>
+              <a:ext uri="{FF2B5EF4-FFF2-40B4-BE49-F238E27FC236}">
+                <a16:creationId xmlns:a16="http://schemas.microsoft.com/office/drawing/2014/main" id="{04FF8AB2-0442-463D-2367-950CCCF683A5}"/>
+              </a:ext>
+            </a:extLst>
+          </p:cNvPr>
+          <p:cNvCxnSpPr/>
+          <p:nvPr/>
+        </p:nvCxnSpPr>
+        <p:spPr>
+          <a:xfrm flipH="1" flipV="1">
+            <a:off x="9542539" y="1392324"/>
+            <a:ext cx="632617" cy="517585"/>
+          </a:xfrm>
+          <a:prstGeom prst="straightConnector1">
+            <a:avLst/>
+          </a:prstGeom>
+          <a:ln w="28575">
+            <a:tailEnd type="triangle"/>
+          </a:ln>
+        </p:spPr>
+        <p:style>
+          <a:lnRef idx="1">
+            <a:schemeClr val="accent1"/>
+          </a:lnRef>
+          <a:fillRef idx="0">
+            <a:schemeClr val="accent1"/>
+          </a:fillRef>
+          <a:effectRef idx="0">
+            <a:schemeClr val="accent1"/>
+          </a:effectRef>
+          <a:fontRef idx="minor">
+            <a:schemeClr val="tx1"/>
+          </a:fontRef>
+        </p:style>
+      </p:cxnSp>
+      <p:sp>
+        <p:nvSpPr>
+          <p:cNvPr id="19" name="TextBox 18">
+            <a:extLst>
+              <a:ext uri="{FF2B5EF4-FFF2-40B4-BE49-F238E27FC236}">
+                <a16:creationId xmlns:a16="http://schemas.microsoft.com/office/drawing/2014/main" id="{30716E08-567E-34B0-438F-82134111AD6A}"/>
+              </a:ext>
+            </a:extLst>
+          </p:cNvPr>
+          <p:cNvSpPr txBox="1"/>
+          <p:nvPr/>
+        </p:nvSpPr>
+        <p:spPr>
+          <a:xfrm>
+            <a:off x="6728343" y="1152622"/>
+            <a:ext cx="2030042" cy="492443"/>
+          </a:xfrm>
+          <a:prstGeom prst="rect">
+            <a:avLst/>
+          </a:prstGeom>
+          <a:noFill/>
+        </p:spPr>
+        <p:txBody>
+          <a:bodyPr wrap="square" rtlCol="0">
+            <a:spAutoFit/>
+          </a:bodyPr>
+          <a:lstStyle/>
+          <a:p>
+            <a:r>
+              <a:rPr lang="ko-KR" altLang="en-US" sz="1400" b="1" dirty="0"/>
+              <a:t>② </a:t>
+            </a:r>
+            <a:r>
+              <a:rPr lang="en-US" altLang="ko-KR" sz="1200" dirty="0"/>
+              <a:t>Standby</a:t>
+            </a:r>
+            <a:r>
+              <a:rPr lang="ko-KR" altLang="en-US" sz="1200" dirty="0"/>
+              <a:t>서버가</a:t>
+            </a:r>
+            <a:endParaRPr lang="en-US" altLang="ko-KR" sz="1200" dirty="0"/>
+          </a:p>
+          <a:p>
+            <a:r>
+              <a:rPr lang="ko-KR" altLang="en-US" sz="1200" dirty="0"/>
+              <a:t>다운되었다고 알림</a:t>
+            </a:r>
+            <a:endParaRPr lang="ko-KR" altLang="en-US" dirty="0"/>
+          </a:p>
+        </p:txBody>
+      </p:sp>
+      <p:cxnSp>
+        <p:nvCxnSpPr>
+          <p:cNvPr id="21" name="직선 화살표 연결선 20">
+            <a:extLst>
+              <a:ext uri="{FF2B5EF4-FFF2-40B4-BE49-F238E27FC236}">
+                <a16:creationId xmlns:a16="http://schemas.microsoft.com/office/drawing/2014/main" id="{8E68D5F5-2A14-CBFB-5FC5-DF0083C1CCD3}"/>
+              </a:ext>
+            </a:extLst>
+          </p:cNvPr>
+          <p:cNvCxnSpPr>
+            <a:cxnSpLocks/>
+          </p:cNvCxnSpPr>
+          <p:nvPr/>
+        </p:nvCxnSpPr>
+        <p:spPr>
+          <a:xfrm flipV="1">
+            <a:off x="7781207" y="1406737"/>
+            <a:ext cx="632617" cy="517585"/>
+          </a:xfrm>
+          <a:prstGeom prst="straightConnector1">
+            <a:avLst/>
+          </a:prstGeom>
+          <a:ln w="28575">
+            <a:tailEnd type="triangle"/>
+          </a:ln>
+        </p:spPr>
+        <p:style>
+          <a:lnRef idx="1">
+            <a:schemeClr val="accent1"/>
+          </a:lnRef>
+          <a:fillRef idx="0">
+            <a:schemeClr val="accent1"/>
+          </a:fillRef>
+          <a:effectRef idx="0">
+            <a:schemeClr val="accent1"/>
+          </a:effectRef>
+          <a:fontRef idx="minor">
+            <a:schemeClr val="tx1"/>
+          </a:fontRef>
+        </p:style>
+      </p:cxnSp>
+      <p:sp>
+        <p:nvSpPr>
+          <p:cNvPr id="33" name="TextBox 32">
+            <a:extLst>
+              <a:ext uri="{FF2B5EF4-FFF2-40B4-BE49-F238E27FC236}">
+                <a16:creationId xmlns:a16="http://schemas.microsoft.com/office/drawing/2014/main" id="{2D70510A-49E6-FD2C-AE86-27500B66EB2E}"/>
+              </a:ext>
+            </a:extLst>
+          </p:cNvPr>
+          <p:cNvSpPr txBox="1"/>
+          <p:nvPr/>
+        </p:nvSpPr>
+        <p:spPr>
+          <a:xfrm>
+            <a:off x="9177313" y="373480"/>
+            <a:ext cx="1785559" cy="646331"/>
+          </a:xfrm>
+          <a:prstGeom prst="rect">
+            <a:avLst/>
+          </a:prstGeom>
+          <a:noFill/>
+        </p:spPr>
+        <p:txBody>
+          <a:bodyPr wrap="square" rtlCol="0">
+            <a:spAutoFit/>
+          </a:bodyPr>
+          <a:lstStyle/>
+          <a:p>
+            <a:r>
+              <a:rPr lang="en-US" altLang="ko-KR" sz="3600" b="1" dirty="0"/>
+              <a:t>?</a:t>
+            </a:r>
+            <a:endParaRPr lang="ko-KR" altLang="en-US" sz="4400" dirty="0"/>
+          </a:p>
+        </p:txBody>
+      </p:sp>
+      <p:pic>
+        <p:nvPicPr>
+          <p:cNvPr id="55" name="그림 54">
+            <a:extLst>
+              <a:ext uri="{FF2B5EF4-FFF2-40B4-BE49-F238E27FC236}">
+                <a16:creationId xmlns:a16="http://schemas.microsoft.com/office/drawing/2014/main" id="{341AD295-788A-630B-D126-402E0FF3C64A}"/>
+              </a:ext>
+            </a:extLst>
+          </p:cNvPr>
+          <p:cNvPicPr>
+            <a:picLocks noChangeAspect="1"/>
+          </p:cNvPicPr>
+          <p:nvPr/>
+        </p:nvPicPr>
+        <p:blipFill>
+          <a:blip r:embed="rId4"/>
+          <a:stretch>
+            <a:fillRect/>
+          </a:stretch>
+        </p:blipFill>
+        <p:spPr>
+          <a:xfrm>
+            <a:off x="7063657" y="3827827"/>
+            <a:ext cx="1104900" cy="1295400"/>
+          </a:xfrm>
+          <a:prstGeom prst="rect">
+            <a:avLst/>
+          </a:prstGeom>
+        </p:spPr>
+      </p:pic>
+      <p:pic>
+        <p:nvPicPr>
+          <p:cNvPr id="59" name="그림 58">
+            <a:extLst>
+              <a:ext uri="{FF2B5EF4-FFF2-40B4-BE49-F238E27FC236}">
+                <a16:creationId xmlns:a16="http://schemas.microsoft.com/office/drawing/2014/main" id="{EEA76209-BD54-9492-4264-3C038048C646}"/>
+              </a:ext>
+            </a:extLst>
+          </p:cNvPr>
+          <p:cNvPicPr>
+            <a:picLocks noChangeAspect="1"/>
+          </p:cNvPicPr>
+          <p:nvPr/>
+        </p:nvPicPr>
+        <p:blipFill>
+          <a:blip r:embed="rId3"/>
+          <a:stretch>
+            <a:fillRect/>
+          </a:stretch>
+        </p:blipFill>
+        <p:spPr>
+          <a:xfrm>
+            <a:off x="8818768" y="3835706"/>
+            <a:ext cx="561975" cy="1162050"/>
+          </a:xfrm>
+          <a:prstGeom prst="rect">
+            <a:avLst/>
+          </a:prstGeom>
+        </p:spPr>
+      </p:pic>
+      <p:sp>
+        <p:nvSpPr>
+          <p:cNvPr id="61" name="곱하기 기호 60">
+            <a:extLst>
+              <a:ext uri="{FF2B5EF4-FFF2-40B4-BE49-F238E27FC236}">
+                <a16:creationId xmlns:a16="http://schemas.microsoft.com/office/drawing/2014/main" id="{2BB3AC40-FE80-D8B0-2F9A-665E5D4F906F}"/>
+              </a:ext>
+            </a:extLst>
+          </p:cNvPr>
+          <p:cNvSpPr/>
+          <p:nvPr/>
+        </p:nvSpPr>
+        <p:spPr>
+          <a:xfrm>
+            <a:off x="8707026" y="3907749"/>
+            <a:ext cx="778042" cy="860132"/>
+          </a:xfrm>
+          <a:prstGeom prst="mathMultiply">
+            <a:avLst/>
+          </a:prstGeom>
+          <a:solidFill>
+            <a:srgbClr val="FF0000"/>
+          </a:solidFill>
+          <a:ln>
+            <a:noFill/>
+          </a:ln>
+        </p:spPr>
+        <p:style>
+          <a:lnRef idx="2">
+            <a:schemeClr val="accent1">
+              <a:shade val="50000"/>
+            </a:schemeClr>
+          </a:lnRef>
+          <a:fillRef idx="1">
+            <a:schemeClr val="accent1"/>
+          </a:fillRef>
+          <a:effectRef idx="0">
+            <a:schemeClr val="accent1"/>
+          </a:effectRef>
+          <a:fontRef idx="minor">
+            <a:schemeClr val="lt1"/>
+          </a:fontRef>
+        </p:style>
+        <p:txBody>
+          <a:bodyPr rtlCol="0" anchor="ctr"/>
+          <a:lstStyle/>
+          <a:p>
+            <a:pPr algn="ctr"/>
+            <a:endParaRPr lang="ko-KR" altLang="en-US"/>
+          </a:p>
+        </p:txBody>
+      </p:sp>
+      <p:sp>
+        <p:nvSpPr>
+          <p:cNvPr id="62" name="TextBox 61">
+            <a:extLst>
+              <a:ext uri="{FF2B5EF4-FFF2-40B4-BE49-F238E27FC236}">
+                <a16:creationId xmlns:a16="http://schemas.microsoft.com/office/drawing/2014/main" id="{882E9A7B-42D8-DB25-369B-C9F45188921B}"/>
+              </a:ext>
+            </a:extLst>
+          </p:cNvPr>
+          <p:cNvSpPr txBox="1"/>
+          <p:nvPr/>
+        </p:nvSpPr>
+        <p:spPr>
+          <a:xfrm>
+            <a:off x="7912183" y="3860036"/>
+            <a:ext cx="1884871" cy="461665"/>
+          </a:xfrm>
+          <a:prstGeom prst="rect">
+            <a:avLst/>
+          </a:prstGeom>
+          <a:noFill/>
+        </p:spPr>
+        <p:txBody>
+          <a:bodyPr wrap="square">
+            <a:spAutoFit/>
+          </a:bodyPr>
+          <a:lstStyle/>
+          <a:p>
+            <a:r>
+              <a:rPr lang="ko-KR" altLang="en-US" sz="1200" dirty="0">
+                <a:solidFill>
+                  <a:prstClr val="black">
+                    <a:lumMod val="85000"/>
+                    <a:lumOff val="15000"/>
+                  </a:prstClr>
+                </a:solidFill>
+                <a:latin typeface="맑은 고딕" panose="020B0503020000020004" pitchFamily="50" charset="-127"/>
+                <a:ea typeface="맑은 고딕" panose="020B0503020000020004" pitchFamily="50" charset="-127"/>
+              </a:rPr>
+              <a:t>  서버</a:t>
+            </a:r>
+            <a:endParaRPr lang="en-US" altLang="ko-KR" sz="1200" dirty="0">
+              <a:solidFill>
+                <a:prstClr val="black">
+                  <a:lumMod val="85000"/>
+                  <a:lumOff val="15000"/>
+                </a:prstClr>
+              </a:solidFill>
+              <a:latin typeface="맑은 고딕" panose="020B0503020000020004" pitchFamily="50" charset="-127"/>
+              <a:ea typeface="맑은 고딕" panose="020B0503020000020004" pitchFamily="50" charset="-127"/>
+            </a:endParaRPr>
+          </a:p>
+          <a:p>
+            <a:r>
+              <a:rPr lang="ko-KR" altLang="en-US" sz="1200" dirty="0">
+                <a:solidFill>
+                  <a:prstClr val="black">
+                    <a:lumMod val="85000"/>
+                    <a:lumOff val="15000"/>
+                  </a:prstClr>
+                </a:solidFill>
+                <a:latin typeface="맑은 고딕" panose="020B0503020000020004" pitchFamily="50" charset="-127"/>
+                <a:ea typeface="맑은 고딕" panose="020B0503020000020004" pitchFamily="50" charset="-127"/>
+              </a:rPr>
+              <a:t>복구작업</a:t>
+            </a:r>
+            <a:endParaRPr lang="ko-KR" altLang="en-US" sz="1200" dirty="0"/>
+          </a:p>
+        </p:txBody>
+      </p:sp>
+      <p:cxnSp>
+        <p:nvCxnSpPr>
+          <p:cNvPr id="66" name="직선 화살표 연결선 65">
+            <a:extLst>
+              <a:ext uri="{FF2B5EF4-FFF2-40B4-BE49-F238E27FC236}">
+                <a16:creationId xmlns:a16="http://schemas.microsoft.com/office/drawing/2014/main" id="{A1F75F56-E07D-615C-FD54-A90BBD3CEB60}"/>
+              </a:ext>
+            </a:extLst>
+          </p:cNvPr>
+          <p:cNvCxnSpPr>
+            <a:cxnSpLocks/>
+          </p:cNvCxnSpPr>
+          <p:nvPr/>
+        </p:nvCxnSpPr>
+        <p:spPr>
+          <a:xfrm>
+            <a:off x="8117960" y="4353909"/>
+            <a:ext cx="420061" cy="0"/>
+          </a:xfrm>
+          <a:prstGeom prst="straightConnector1">
+            <a:avLst/>
+          </a:prstGeom>
+          <a:ln w="28575">
+            <a:tailEnd type="triangle"/>
+          </a:ln>
+        </p:spPr>
+        <p:style>
+          <a:lnRef idx="1">
+            <a:schemeClr val="accent1"/>
+          </a:lnRef>
+          <a:fillRef idx="0">
+            <a:schemeClr val="accent1"/>
+          </a:fillRef>
+          <a:effectRef idx="0">
+            <a:schemeClr val="accent1"/>
+          </a:effectRef>
+          <a:fontRef idx="minor">
+            <a:schemeClr val="tx1"/>
+          </a:fontRef>
+        </p:style>
+      </p:cxnSp>
+      <p:pic>
+        <p:nvPicPr>
+          <p:cNvPr id="69" name="그림 68">
+            <a:extLst>
+              <a:ext uri="{FF2B5EF4-FFF2-40B4-BE49-F238E27FC236}">
+                <a16:creationId xmlns:a16="http://schemas.microsoft.com/office/drawing/2014/main" id="{76045315-A961-55B3-2439-01CA67DAE16E}"/>
+              </a:ext>
+            </a:extLst>
+          </p:cNvPr>
+          <p:cNvPicPr>
+            <a:picLocks noChangeAspect="1"/>
+          </p:cNvPicPr>
+          <p:nvPr/>
+        </p:nvPicPr>
+        <p:blipFill>
+          <a:blip r:embed="rId5">
+            <a:extLst>
+              <a:ext uri="{28A0092B-C50C-407E-A947-70E740481C1C}">
+                <a14:useLocalDpi xmlns:a14="http://schemas.microsoft.com/office/drawing/2010/main" val="0"/>
+              </a:ext>
+            </a:extLst>
+          </a:blip>
+          <a:stretch>
+            <a:fillRect/>
+          </a:stretch>
+        </p:blipFill>
+        <p:spPr>
+          <a:xfrm>
+            <a:off x="8711246" y="5467469"/>
+            <a:ext cx="909202" cy="909202"/>
+          </a:xfrm>
+          <a:prstGeom prst="rect">
+            <a:avLst/>
+          </a:prstGeom>
+        </p:spPr>
+      </p:pic>
+      <p:pic>
+        <p:nvPicPr>
+          <p:cNvPr id="70" name="그림 69">
+            <a:extLst>
+              <a:ext uri="{FF2B5EF4-FFF2-40B4-BE49-F238E27FC236}">
+                <a16:creationId xmlns:a16="http://schemas.microsoft.com/office/drawing/2014/main" id="{41C43D4F-5D19-F218-32DA-BA4E73746BFD}"/>
+              </a:ext>
+            </a:extLst>
+          </p:cNvPr>
+          <p:cNvPicPr>
+            <a:picLocks noChangeAspect="1"/>
+          </p:cNvPicPr>
+          <p:nvPr/>
+        </p:nvPicPr>
+        <p:blipFill>
+          <a:blip r:embed="rId4"/>
+          <a:stretch>
+            <a:fillRect/>
+          </a:stretch>
+        </p:blipFill>
+        <p:spPr>
+          <a:xfrm>
+            <a:off x="7063657" y="5329648"/>
+            <a:ext cx="1104900" cy="1295400"/>
+          </a:xfrm>
+          <a:prstGeom prst="rect">
+            <a:avLst/>
+          </a:prstGeom>
+        </p:spPr>
+      </p:pic>
+      <p:cxnSp>
+        <p:nvCxnSpPr>
+          <p:cNvPr id="71" name="직선 화살표 연결선 70">
+            <a:extLst>
+              <a:ext uri="{FF2B5EF4-FFF2-40B4-BE49-F238E27FC236}">
+                <a16:creationId xmlns:a16="http://schemas.microsoft.com/office/drawing/2014/main" id="{ABE0E40A-01A7-2F4E-A6C1-825101EDA141}"/>
+              </a:ext>
+            </a:extLst>
+          </p:cNvPr>
+          <p:cNvCxnSpPr>
+            <a:cxnSpLocks/>
+          </p:cNvCxnSpPr>
+          <p:nvPr/>
+        </p:nvCxnSpPr>
+        <p:spPr>
+          <a:xfrm>
+            <a:off x="8158710" y="5909688"/>
+            <a:ext cx="420061" cy="0"/>
+          </a:xfrm>
+          <a:prstGeom prst="straightConnector1">
+            <a:avLst/>
+          </a:prstGeom>
+          <a:ln w="28575">
+            <a:tailEnd type="triangle"/>
+          </a:ln>
+        </p:spPr>
+        <p:style>
+          <a:lnRef idx="1">
+            <a:schemeClr val="accent1"/>
+          </a:lnRef>
+          <a:fillRef idx="0">
+            <a:schemeClr val="accent1"/>
+          </a:fillRef>
+          <a:effectRef idx="0">
+            <a:schemeClr val="accent1"/>
+          </a:effectRef>
+          <a:fontRef idx="minor">
+            <a:schemeClr val="tx1"/>
+          </a:fontRef>
+        </p:style>
+      </p:cxnSp>
+      <p:sp>
+        <p:nvSpPr>
+          <p:cNvPr id="72" name="TextBox 71">
+            <a:extLst>
+              <a:ext uri="{FF2B5EF4-FFF2-40B4-BE49-F238E27FC236}">
+                <a16:creationId xmlns:a16="http://schemas.microsoft.com/office/drawing/2014/main" id="{5B984130-CF2E-3C74-F2BA-3994BA8F98BF}"/>
+              </a:ext>
+            </a:extLst>
+          </p:cNvPr>
+          <p:cNvSpPr txBox="1"/>
+          <p:nvPr/>
+        </p:nvSpPr>
+        <p:spPr>
+          <a:xfrm>
+            <a:off x="7768810" y="5382047"/>
+            <a:ext cx="1884871" cy="461665"/>
+          </a:xfrm>
+          <a:prstGeom prst="rect">
+            <a:avLst/>
+          </a:prstGeom>
+          <a:noFill/>
+        </p:spPr>
+        <p:txBody>
+          <a:bodyPr wrap="square">
+            <a:spAutoFit/>
+          </a:bodyPr>
+          <a:lstStyle/>
+          <a:p>
+            <a:r>
+              <a:rPr lang="ko-KR" altLang="en-US" sz="1200" dirty="0">
+                <a:solidFill>
+                  <a:prstClr val="black">
+                    <a:lumMod val="85000"/>
+                    <a:lumOff val="15000"/>
+                  </a:prstClr>
+                </a:solidFill>
+                <a:latin typeface="맑은 고딕" panose="020B0503020000020004" pitchFamily="50" charset="-127"/>
+                <a:ea typeface="맑은 고딕" panose="020B0503020000020004" pitchFamily="50" charset="-127"/>
+              </a:rPr>
+              <a:t>서버간 통신장애</a:t>
+            </a:r>
+            <a:endParaRPr lang="en-US" altLang="ko-KR" sz="1200" dirty="0">
+              <a:solidFill>
+                <a:prstClr val="black">
+                  <a:lumMod val="85000"/>
+                  <a:lumOff val="15000"/>
+                </a:prstClr>
+              </a:solidFill>
+              <a:latin typeface="맑은 고딕" panose="020B0503020000020004" pitchFamily="50" charset="-127"/>
+              <a:ea typeface="맑은 고딕" panose="020B0503020000020004" pitchFamily="50" charset="-127"/>
+            </a:endParaRPr>
+          </a:p>
+          <a:p>
+            <a:r>
+              <a:rPr lang="ko-KR" altLang="en-US" sz="1200" dirty="0">
+                <a:solidFill>
+                  <a:prstClr val="black">
+                    <a:lumMod val="85000"/>
+                    <a:lumOff val="15000"/>
+                  </a:prstClr>
+                </a:solidFill>
+                <a:latin typeface="맑은 고딕" panose="020B0503020000020004" pitchFamily="50" charset="-127"/>
+                <a:ea typeface="맑은 고딕" panose="020B0503020000020004" pitchFamily="50" charset="-127"/>
+              </a:rPr>
+              <a:t>  사실을 알림</a:t>
+            </a:r>
+            <a:r>
+              <a:rPr lang="en-US" altLang="ko-KR" sz="1200" dirty="0">
+                <a:solidFill>
+                  <a:prstClr val="black">
+                    <a:lumMod val="85000"/>
+                    <a:lumOff val="15000"/>
+                  </a:prstClr>
+                </a:solidFill>
+                <a:latin typeface="맑은 고딕" panose="020B0503020000020004" pitchFamily="50" charset="-127"/>
+                <a:ea typeface="맑은 고딕" panose="020B0503020000020004" pitchFamily="50" charset="-127"/>
+              </a:rPr>
+              <a:t>.</a:t>
+            </a:r>
+            <a:endParaRPr lang="ko-KR" altLang="en-US" sz="1200" dirty="0"/>
+          </a:p>
+        </p:txBody>
+      </p:sp>
+    </p:spTree>
+    <p:extLst>
+      <p:ext uri="{BB962C8B-B14F-4D97-AF65-F5344CB8AC3E}">
+        <p14:creationId xmlns:p14="http://schemas.microsoft.com/office/powerpoint/2010/main" val="732302837"/>
+      </p:ext>
+    </p:extLst>
+  </p:cSld>
+  <p:clrMapOvr>
+    <a:masterClrMapping/>
+  </p:clrMapOvr>
+  <mc:AlternateContent xmlns:mc="http://schemas.openxmlformats.org/markup-compatibility/2006" xmlns:p14="http://schemas.microsoft.com/office/powerpoint/2010/main">
+    <mc:Choice Requires="p14">
+      <p:transition spd="med" p14:dur="700">
+        <p:fade/>
+      </p:transition>
+    </mc:Choice>
+    <mc:Fallback xmlns="">
+      <p:transition spd="med">
+        <p:fade/>
+      </p:transition>
+    </mc:Fallback>
+  </mc:AlternateContent>
+</p:sld>
+</file>
+
+<file path=ppt/slides/slide11.xml><?xml version="1.0" encoding="utf-8"?>
+<p:sld xmlns:a="http://schemas.openxmlformats.org/drawingml/2006/main" xmlns:r="http://schemas.openxmlformats.org/officeDocument/2006/relationships" xmlns:p="http://schemas.openxmlformats.org/presentationml/2006/main">
+  <p:cSld>
+    <p:spTree>
+      <p:nvGrpSpPr>
+        <p:cNvPr id="1" name=""/>
+        <p:cNvGrpSpPr/>
+        <p:nvPr/>
+      </p:nvGrpSpPr>
+      <p:grpSpPr>
+        <a:xfrm>
+          <a:off x="0" y="0"/>
+          <a:ext cx="0" cy="0"/>
+          <a:chOff x="0" y="0"/>
+          <a:chExt cx="0" cy="0"/>
+        </a:xfrm>
+      </p:grpSpPr>
       <p:pic>
         <p:nvPicPr>
           <p:cNvPr id="3" name="그림 2">
@@ -4857,7 +6992,7 @@
 </p:sld>
 </file>
 
-<file path=ppt/slides/slide11.xml><?xml version="1.0" encoding="utf-8"?>
+<file path=ppt/slides/slide12.xml><?xml version="1.0" encoding="utf-8"?>
 <p:sld xmlns:a="http://schemas.openxmlformats.org/drawingml/2006/main" xmlns:r="http://schemas.openxmlformats.org/officeDocument/2006/relationships" xmlns:p="http://schemas.openxmlformats.org/presentationml/2006/main">
   <p:cSld>
     <p:spTree>
@@ -5157,7 +7292,7 @@
                 <a:latin typeface="맑은 고딕" panose="020B0503020000020004" pitchFamily="50" charset="-127"/>
                 <a:ea typeface="맑은 고딕" panose="020B0503020000020004" pitchFamily="50" charset="-127"/>
               </a:rPr>
-              <a:t> </a:t>
+              <a:t> : </a:t>
             </a:r>
             <a:r>
               <a:rPr lang="ko-KR" altLang="en-US" sz="1400" dirty="0">
@@ -5170,17 +7305,20 @@
                 <a:latin typeface="맑은 고딕" panose="020B0503020000020004" pitchFamily="50" charset="-127"/>
                 <a:ea typeface="맑은 고딕" panose="020B0503020000020004" pitchFamily="50" charset="-127"/>
               </a:rPr>
-              <a:t>서버 다운이 감지되면 </a:t>
-            </a:r>
-            <a:r>
-              <a:rPr lang="en-US" altLang="ko-KR" sz="1600" dirty="0" err="1">
-                <a:solidFill>
-                  <a:srgbClr val="6F008A"/>
-                </a:solidFill>
-                <a:latin typeface="돋움체" panose="020B0609000101010101" pitchFamily="49" charset="-127"/>
-                <a:ea typeface="돋움체" panose="020B0609000101010101" pitchFamily="49" charset="-127"/>
-              </a:rPr>
-              <a:t>ShellExecute</a:t>
+              <a:t>서버 다운이 감지되면 같은 역할의 서버 혹은 상위 서버가 다운된 서버의 </a:t>
+            </a:r>
+            <a:r>
+              <a:rPr lang="en-US" altLang="ko-KR" sz="1400" dirty="0">
+                <a:solidFill>
+                  <a:prstClr val="black">
+                    <a:lumMod val="85000"/>
+                    <a:lumOff val="15000"/>
+                  </a:prstClr>
+                </a:solidFill>
+                <a:latin typeface="맑은 고딕" panose="020B0503020000020004" pitchFamily="50" charset="-127"/>
+                <a:ea typeface="맑은 고딕" panose="020B0503020000020004" pitchFamily="50" charset="-127"/>
+              </a:rPr>
+              <a:t>exe</a:t>
             </a:r>
             <a:r>
               <a:rPr lang="ko-KR" altLang="en-US" sz="1400" dirty="0">
@@ -5193,33 +7331,7 @@
                 <a:latin typeface="맑은 고딕" panose="020B0503020000020004" pitchFamily="50" charset="-127"/>
                 <a:ea typeface="맑은 고딕" panose="020B0503020000020004" pitchFamily="50" charset="-127"/>
               </a:rPr>
-              <a:t>를 이용하여 서버</a:t>
-            </a:r>
-            <a:r>
-              <a:rPr lang="en-US" altLang="ko-KR" sz="1400" dirty="0">
-                <a:solidFill>
-                  <a:prstClr val="black">
-                    <a:lumMod val="85000"/>
-                    <a:lumOff val="15000"/>
-                  </a:prstClr>
-                </a:solidFill>
-                <a:latin typeface="맑은 고딕" panose="020B0503020000020004" pitchFamily="50" charset="-127"/>
-                <a:ea typeface="맑은 고딕" panose="020B0503020000020004" pitchFamily="50" charset="-127"/>
-              </a:rPr>
-              <a:t> exe</a:t>
-            </a:r>
-            <a:r>
-              <a:rPr lang="ko-KR" altLang="en-US" sz="1400" dirty="0">
-                <a:solidFill>
-                  <a:prstClr val="black">
-                    <a:lumMod val="85000"/>
-                    <a:lumOff val="15000"/>
-                  </a:prstClr>
-                </a:solidFill>
-                <a:latin typeface="맑은 고딕" panose="020B0503020000020004" pitchFamily="50" charset="-127"/>
-                <a:ea typeface="맑은 고딕" panose="020B0503020000020004" pitchFamily="50" charset="-127"/>
-              </a:rPr>
-              <a:t>파일을 실행하는 방법으로 구현해보았습니다</a:t>
+              <a:t>파일을 재실행합니다</a:t>
             </a:r>
             <a:r>
               <a:rPr lang="en-US" altLang="ko-KR" sz="1400" dirty="0">
@@ -5248,71 +7360,16 @@
               <a:tabLst/>
               <a:defRPr/>
             </a:pPr>
-            <a:r>
-              <a:rPr lang="en-US" altLang="ko-KR" sz="1400" dirty="0">
-                <a:solidFill>
-                  <a:prstClr val="black">
-                    <a:lumMod val="85000"/>
-                    <a:lumOff val="15000"/>
-                  </a:prstClr>
-                </a:solidFill>
-                <a:latin typeface="맑은 고딕" panose="020B0503020000020004" pitchFamily="50" charset="-127"/>
-                <a:ea typeface="맑은 고딕" panose="020B0503020000020004" pitchFamily="50" charset="-127"/>
-              </a:rPr>
-              <a:t> (XD\Lab\Server\</a:t>
-            </a:r>
-            <a:r>
-              <a:rPr lang="en-US" altLang="ko-KR" sz="1400" dirty="0" err="1">
-                <a:solidFill>
-                  <a:prstClr val="black">
-                    <a:lumMod val="85000"/>
-                    <a:lumOff val="15000"/>
-                  </a:prstClr>
-                </a:solidFill>
-                <a:latin typeface="맑은 고딕" panose="020B0503020000020004" pitchFamily="50" charset="-127"/>
-                <a:ea typeface="맑은 고딕" panose="020B0503020000020004" pitchFamily="50" charset="-127"/>
-              </a:rPr>
-              <a:t>MyWatchdog</a:t>
-            </a:r>
-            <a:r>
-              <a:rPr lang="en-US" altLang="ko-KR" sz="1400" dirty="0">
-                <a:solidFill>
-                  <a:prstClr val="black">
-                    <a:lumMod val="85000"/>
-                    <a:lumOff val="15000"/>
-                  </a:prstClr>
-                </a:solidFill>
-                <a:latin typeface="맑은 고딕" panose="020B0503020000020004" pitchFamily="50" charset="-127"/>
-                <a:ea typeface="맑은 고딕" panose="020B0503020000020004" pitchFamily="50" charset="-127"/>
-              </a:rPr>
-              <a:t> </a:t>
-            </a:r>
-            <a:r>
-              <a:rPr lang="ko-KR" altLang="en-US" sz="1400" dirty="0">
-                <a:solidFill>
-                  <a:prstClr val="black">
-                    <a:lumMod val="85000"/>
-                    <a:lumOff val="15000"/>
-                  </a:prstClr>
-                </a:solidFill>
-                <a:latin typeface="맑은 고딕" panose="020B0503020000020004" pitchFamily="50" charset="-127"/>
-                <a:ea typeface="맑은 고딕" panose="020B0503020000020004" pitchFamily="50" charset="-127"/>
-              </a:rPr>
-              <a:t>에서 재실행 관련 테스트를 해보았습니다</a:t>
-            </a:r>
-            <a:r>
-              <a:rPr lang="en-US" altLang="ko-KR" sz="1400" dirty="0">
-                <a:solidFill>
-                  <a:prstClr val="black">
-                    <a:lumMod val="85000"/>
-                    <a:lumOff val="15000"/>
-                  </a:prstClr>
-                </a:solidFill>
-                <a:latin typeface="맑은 고딕" panose="020B0503020000020004" pitchFamily="50" charset="-127"/>
-                <a:ea typeface="맑은 고딕" panose="020B0503020000020004" pitchFamily="50" charset="-127"/>
-              </a:rPr>
-              <a:t>.)</a:t>
-            </a:r>
+            <a:endParaRPr lang="en-US" altLang="ko-KR" sz="1400" dirty="0">
+              <a:solidFill>
+                <a:prstClr val="black">
+                  <a:lumMod val="85000"/>
+                  <a:lumOff val="15000"/>
+                </a:prstClr>
+              </a:solidFill>
+              <a:latin typeface="맑은 고딕" panose="020B0503020000020004" pitchFamily="50" charset="-127"/>
+              <a:ea typeface="맑은 고딕" panose="020B0503020000020004" pitchFamily="50" charset="-127"/>
+            </a:endParaRPr>
           </a:p>
           <a:p>
             <a:pPr marR="0" lvl="0" algn="l" defTabSz="914400" rtl="0" eaLnBrk="1" fontAlgn="auto" latinLnBrk="1" hangingPunct="1">
@@ -5328,31 +7385,106 @@
               <a:defRPr/>
             </a:pPr>
             <a:r>
-              <a:rPr lang="ko-KR" altLang="en-US" sz="1400" dirty="0">
-                <a:solidFill>
-                  <a:prstClr val="black">
-                    <a:lumMod val="85000"/>
-                    <a:lumOff val="15000"/>
-                  </a:prstClr>
-                </a:solidFill>
-                <a:latin typeface="맑은 고딕" panose="020B0503020000020004" pitchFamily="50" charset="-127"/>
-                <a:ea typeface="맑은 고딕" panose="020B0503020000020004" pitchFamily="50" charset="-127"/>
-              </a:rPr>
-              <a:t> → 현재는 외부 프로그램이 서버를 감시하는 형태로 제작되었지만</a:t>
-            </a:r>
-            <a:r>
-              <a:rPr lang="en-US" altLang="ko-KR" sz="1400" dirty="0">
-                <a:solidFill>
-                  <a:prstClr val="black">
-                    <a:lumMod val="85000"/>
-                    <a:lumOff val="15000"/>
-                  </a:prstClr>
-                </a:solidFill>
-                <a:latin typeface="맑은 고딕" panose="020B0503020000020004" pitchFamily="50" charset="-127"/>
-                <a:ea typeface="맑은 고딕" panose="020B0503020000020004" pitchFamily="50" charset="-127"/>
-              </a:rPr>
-              <a:t>,</a:t>
-            </a:r>
+              <a:rPr lang="ko-KR" altLang="en-US" sz="1600" dirty="0">
+                <a:solidFill>
+                  <a:prstClr val="black">
+                    <a:lumMod val="85000"/>
+                    <a:lumOff val="15000"/>
+                  </a:prstClr>
+                </a:solidFill>
+                <a:latin typeface="맑은 고딕" panose="020B0503020000020004" pitchFamily="50" charset="-127"/>
+                <a:ea typeface="맑은 고딕" panose="020B0503020000020004" pitchFamily="50" charset="-127"/>
+              </a:rPr>
+              <a:t>② 릴레이 서버와 </a:t>
+            </a:r>
+            <a:r>
+              <a:rPr lang="en-US" altLang="ko-KR" sz="1600" dirty="0">
+                <a:solidFill>
+                  <a:prstClr val="black">
+                    <a:lumMod val="85000"/>
+                    <a:lumOff val="15000"/>
+                  </a:prstClr>
+                </a:solidFill>
+                <a:latin typeface="맑은 고딕" panose="020B0503020000020004" pitchFamily="50" charset="-127"/>
+                <a:ea typeface="맑은 고딕" panose="020B0503020000020004" pitchFamily="50" charset="-127"/>
+              </a:rPr>
+              <a:t>(</a:t>
+            </a:r>
+            <a:r>
+              <a:rPr lang="ko-KR" altLang="en-US" sz="1600" dirty="0">
+                <a:solidFill>
+                  <a:prstClr val="black">
+                    <a:lumMod val="85000"/>
+                    <a:lumOff val="15000"/>
+                  </a:prstClr>
+                </a:solidFill>
+                <a:latin typeface="맑은 고딕" panose="020B0503020000020004" pitchFamily="50" charset="-127"/>
+                <a:ea typeface="맑은 고딕" panose="020B0503020000020004" pitchFamily="50" charset="-127"/>
+              </a:rPr>
+              <a:t>릴레이 서버의 경우 클라이언트</a:t>
+            </a:r>
+            <a:r>
+              <a:rPr lang="en-US" altLang="ko-KR" sz="1600" dirty="0">
+                <a:solidFill>
+                  <a:prstClr val="black">
+                    <a:lumMod val="85000"/>
+                    <a:lumOff val="15000"/>
+                  </a:prstClr>
+                </a:solidFill>
+                <a:latin typeface="맑은 고딕" panose="020B0503020000020004" pitchFamily="50" charset="-127"/>
+                <a:ea typeface="맑은 고딕" panose="020B0503020000020004" pitchFamily="50" charset="-127"/>
+              </a:rPr>
+              <a:t>, NPC</a:t>
+            </a:r>
+            <a:r>
+              <a:rPr lang="ko-KR" altLang="en-US" sz="1600" dirty="0">
+                <a:solidFill>
+                  <a:prstClr val="black">
+                    <a:lumMod val="85000"/>
+                    <a:lumOff val="15000"/>
+                  </a:prstClr>
+                </a:solidFill>
+                <a:latin typeface="맑은 고딕" panose="020B0503020000020004" pitchFamily="50" charset="-127"/>
+                <a:ea typeface="맑은 고딕" panose="020B0503020000020004" pitchFamily="50" charset="-127"/>
+              </a:rPr>
+              <a:t>서버의 경우 로직 서버와</a:t>
+            </a:r>
+            <a:r>
+              <a:rPr lang="en-US" altLang="ko-KR" sz="1600" dirty="0">
+                <a:solidFill>
+                  <a:prstClr val="black">
+                    <a:lumMod val="85000"/>
+                    <a:lumOff val="15000"/>
+                  </a:prstClr>
+                </a:solidFill>
+                <a:latin typeface="맑은 고딕" panose="020B0503020000020004" pitchFamily="50" charset="-127"/>
+                <a:ea typeface="맑은 고딕" panose="020B0503020000020004" pitchFamily="50" charset="-127"/>
+              </a:rPr>
+              <a:t>) </a:t>
+            </a:r>
+            <a:r>
+              <a:rPr lang="ko-KR" altLang="en-US" sz="1600" dirty="0">
+                <a:solidFill>
+                  <a:prstClr val="black">
+                    <a:lumMod val="85000"/>
+                    <a:lumOff val="15000"/>
+                  </a:prstClr>
+                </a:solidFill>
+                <a:latin typeface="맑은 고딕" panose="020B0503020000020004" pitchFamily="50" charset="-127"/>
+                <a:ea typeface="맑은 고딕" panose="020B0503020000020004" pitchFamily="50" charset="-127"/>
+              </a:rPr>
+              <a:t>다시 연결</a:t>
+            </a:r>
+            <a:endParaRPr lang="en-US" altLang="ko-KR" sz="1600" dirty="0">
+              <a:solidFill>
+                <a:prstClr val="black">
+                  <a:lumMod val="85000"/>
+                  <a:lumOff val="15000"/>
+                </a:prstClr>
+              </a:solidFill>
+              <a:latin typeface="맑은 고딕" panose="020B0503020000020004" pitchFamily="50" charset="-127"/>
+              <a:ea typeface="맑은 고딕" panose="020B0503020000020004" pitchFamily="50" charset="-127"/>
+            </a:endParaRPr>
           </a:p>
           <a:p>
             <a:pPr marR="0" lvl="0" algn="l" defTabSz="914400" rtl="0" eaLnBrk="1" fontAlgn="auto" latinLnBrk="1" hangingPunct="1">
@@ -5367,103 +7499,12 @@
               <a:tabLst/>
               <a:defRPr/>
             </a:pPr>
-            <a:r>
-              <a:rPr lang="ko-KR" altLang="en-US" sz="1400" dirty="0">
-                <a:solidFill>
-                  <a:prstClr val="black">
-                    <a:lumMod val="85000"/>
-                    <a:lumOff val="15000"/>
-                  </a:prstClr>
-                </a:solidFill>
-                <a:latin typeface="맑은 고딕" panose="020B0503020000020004" pitchFamily="50" charset="-127"/>
-                <a:ea typeface="맑은 고딕" panose="020B0503020000020004" pitchFamily="50" charset="-127"/>
-              </a:rPr>
-              <a:t>  추후에 같은 역할의 서버끼리 </a:t>
-            </a:r>
-            <a:r>
-              <a:rPr lang="en-US" altLang="ko-KR" sz="1400" dirty="0">
-                <a:solidFill>
-                  <a:prstClr val="black">
-                    <a:lumMod val="85000"/>
-                    <a:lumOff val="15000"/>
-                  </a:prstClr>
-                </a:solidFill>
-                <a:latin typeface="맑은 고딕" panose="020B0503020000020004" pitchFamily="50" charset="-127"/>
-                <a:ea typeface="맑은 고딕" panose="020B0503020000020004" pitchFamily="50" charset="-127"/>
-              </a:rPr>
-              <a:t>Heartbeat</a:t>
-            </a:r>
-            <a:r>
-              <a:rPr lang="ko-KR" altLang="en-US" sz="1400" dirty="0">
-                <a:solidFill>
-                  <a:prstClr val="black">
-                    <a:lumMod val="85000"/>
-                    <a:lumOff val="15000"/>
-                  </a:prstClr>
-                </a:solidFill>
-                <a:latin typeface="맑은 고딕" panose="020B0503020000020004" pitchFamily="50" charset="-127"/>
-                <a:ea typeface="맑은 고딕" panose="020B0503020000020004" pitchFamily="50" charset="-127"/>
-              </a:rPr>
-              <a:t>를 주고받는 형태로 수정할 계획입니다</a:t>
-            </a:r>
-            <a:r>
-              <a:rPr lang="en-US" altLang="ko-KR" sz="1400" dirty="0">
-                <a:solidFill>
-                  <a:prstClr val="black">
-                    <a:lumMod val="85000"/>
-                    <a:lumOff val="15000"/>
-                  </a:prstClr>
-                </a:solidFill>
-                <a:latin typeface="맑은 고딕" panose="020B0503020000020004" pitchFamily="50" charset="-127"/>
-                <a:ea typeface="맑은 고딕" panose="020B0503020000020004" pitchFamily="50" charset="-127"/>
-              </a:rPr>
-              <a:t>. </a:t>
-            </a:r>
-            <a:r>
-              <a:rPr lang="en-US" altLang="ko-KR" sz="1100" dirty="0">
-                <a:solidFill>
-                  <a:schemeClr val="tx1">
-                    <a:lumMod val="65000"/>
-                    <a:lumOff val="35000"/>
-                  </a:schemeClr>
-                </a:solidFill>
-                <a:latin typeface="맑은 고딕" panose="020B0503020000020004" pitchFamily="50" charset="-127"/>
-                <a:ea typeface="맑은 고딕" panose="020B0503020000020004" pitchFamily="50" charset="-127"/>
-              </a:rPr>
-              <a:t>(</a:t>
-            </a:r>
-            <a:r>
-              <a:rPr lang="ko-KR" altLang="en-US" sz="1100" dirty="0">
-                <a:solidFill>
-                  <a:schemeClr val="tx1">
-                    <a:lumMod val="65000"/>
-                    <a:lumOff val="35000"/>
-                  </a:schemeClr>
-                </a:solidFill>
-                <a:latin typeface="맑은 고딕" panose="020B0503020000020004" pitchFamily="50" charset="-127"/>
-                <a:ea typeface="맑은 고딕" panose="020B0503020000020004" pitchFamily="50" charset="-127"/>
-              </a:rPr>
-              <a:t>다음 미팅까지 해오겠습니다</a:t>
-            </a:r>
-            <a:r>
-              <a:rPr lang="en-US" altLang="ko-KR" sz="1100" dirty="0">
-                <a:solidFill>
-                  <a:schemeClr val="tx1">
-                    <a:lumMod val="65000"/>
-                    <a:lumOff val="35000"/>
-                  </a:schemeClr>
-                </a:solidFill>
-                <a:latin typeface="맑은 고딕" panose="020B0503020000020004" pitchFamily="50" charset="-127"/>
-                <a:ea typeface="맑은 고딕" panose="020B0503020000020004" pitchFamily="50" charset="-127"/>
-              </a:rPr>
-              <a:t>.)</a:t>
-            </a:r>
-            <a:endParaRPr lang="en-US" altLang="ko-KR" sz="1400" dirty="0">
+            <a:endParaRPr lang="en-US" altLang="ko-KR" sz="1600" dirty="0">
               <a:solidFill>
-                <a:schemeClr val="tx1">
-                  <a:lumMod val="65000"/>
-                  <a:lumOff val="35000"/>
-                </a:schemeClr>
+                <a:prstClr val="black">
+                  <a:lumMod val="85000"/>
+                  <a:lumOff val="15000"/>
+                </a:prstClr>
               </a:solidFill>
               <a:latin typeface="맑은 고딕" panose="020B0503020000020004" pitchFamily="50" charset="-127"/>
               <a:ea typeface="맑은 고딕" panose="020B0503020000020004" pitchFamily="50" charset="-127"/>
@@ -5493,7 +7534,7 @@
                 <a:latin typeface="맑은 고딕" panose="020B0503020000020004" pitchFamily="50" charset="-127"/>
                 <a:ea typeface="맑은 고딕" panose="020B0503020000020004" pitchFamily="50" charset="-127"/>
               </a:rPr>
-              <a:t>② 릴레이 서버와 </a:t>
+              <a:t>③ 같은 종류의 서버들과 </a:t>
             </a:r>
             <a:r>
               <a:rPr lang="en-US" altLang="ko-KR" sz="1600" dirty="0">
@@ -5506,7 +7547,7 @@
                 <a:latin typeface="맑은 고딕" panose="020B0503020000020004" pitchFamily="50" charset="-127"/>
                 <a:ea typeface="맑은 고딕" panose="020B0503020000020004" pitchFamily="50" charset="-127"/>
               </a:rPr>
-              <a:t>(</a:t>
+              <a:t>Heartbeat </a:t>
             </a:r>
             <a:r>
               <a:rPr lang="ko-KR" altLang="en-US" sz="1600" dirty="0">
@@ -5519,59 +7560,7 @@
                 <a:latin typeface="맑은 고딕" panose="020B0503020000020004" pitchFamily="50" charset="-127"/>
                 <a:ea typeface="맑은 고딕" panose="020B0503020000020004" pitchFamily="50" charset="-127"/>
               </a:rPr>
-              <a:t>릴레이 서버의 경우 클라이언트</a:t>
-            </a:r>
-            <a:r>
-              <a:rPr lang="en-US" altLang="ko-KR" sz="1600" dirty="0">
-                <a:solidFill>
-                  <a:prstClr val="black">
-                    <a:lumMod val="85000"/>
-                    <a:lumOff val="15000"/>
-                  </a:prstClr>
-                </a:solidFill>
-                <a:latin typeface="맑은 고딕" panose="020B0503020000020004" pitchFamily="50" charset="-127"/>
-                <a:ea typeface="맑은 고딕" panose="020B0503020000020004" pitchFamily="50" charset="-127"/>
-              </a:rPr>
-              <a:t>, NPC</a:t>
-            </a:r>
-            <a:r>
-              <a:rPr lang="ko-KR" altLang="en-US" sz="1600" dirty="0">
-                <a:solidFill>
-                  <a:prstClr val="black">
-                    <a:lumMod val="85000"/>
-                    <a:lumOff val="15000"/>
-                  </a:prstClr>
-                </a:solidFill>
-                <a:latin typeface="맑은 고딕" panose="020B0503020000020004" pitchFamily="50" charset="-127"/>
-                <a:ea typeface="맑은 고딕" panose="020B0503020000020004" pitchFamily="50" charset="-127"/>
-              </a:rPr>
-              <a:t>서버의 경우 로직 서버와</a:t>
-            </a:r>
-            <a:r>
-              <a:rPr lang="en-US" altLang="ko-KR" sz="1600" dirty="0">
-                <a:solidFill>
-                  <a:prstClr val="black">
-                    <a:lumMod val="85000"/>
-                    <a:lumOff val="15000"/>
-                  </a:prstClr>
-                </a:solidFill>
-                <a:latin typeface="맑은 고딕" panose="020B0503020000020004" pitchFamily="50" charset="-127"/>
-                <a:ea typeface="맑은 고딕" panose="020B0503020000020004" pitchFamily="50" charset="-127"/>
-              </a:rPr>
-              <a:t>) </a:t>
-            </a:r>
-            <a:r>
-              <a:rPr lang="ko-KR" altLang="en-US" sz="1600" dirty="0">
-                <a:solidFill>
-                  <a:prstClr val="black">
-                    <a:lumMod val="85000"/>
-                    <a:lumOff val="15000"/>
-                  </a:prstClr>
-                </a:solidFill>
-                <a:latin typeface="맑은 고딕" panose="020B0503020000020004" pitchFamily="50" charset="-127"/>
-                <a:ea typeface="맑은 고딕" panose="020B0503020000020004" pitchFamily="50" charset="-127"/>
-              </a:rPr>
-              <a:t>다시 연결</a:t>
+              <a:t>교환 재개</a:t>
             </a:r>
             <a:endParaRPr lang="en-US" altLang="ko-KR" sz="1600" dirty="0">
               <a:solidFill>
@@ -5597,45 +7586,6 @@
               <a:tabLst/>
               <a:defRPr/>
             </a:pPr>
-            <a:r>
-              <a:rPr lang="ko-KR" altLang="en-US" sz="1600" dirty="0">
-                <a:solidFill>
-                  <a:prstClr val="black">
-                    <a:lumMod val="85000"/>
-                    <a:lumOff val="15000"/>
-                  </a:prstClr>
-                </a:solidFill>
-                <a:latin typeface="맑은 고딕" panose="020B0503020000020004" pitchFamily="50" charset="-127"/>
-                <a:ea typeface="맑은 고딕" panose="020B0503020000020004" pitchFamily="50" charset="-127"/>
-              </a:rPr>
-              <a:t>③ 같은 종류의 서버들과 </a:t>
-            </a:r>
-            <a:r>
-              <a:rPr lang="en-US" altLang="ko-KR" sz="1600" dirty="0">
-                <a:solidFill>
-                  <a:prstClr val="black">
-                    <a:lumMod val="85000"/>
-                    <a:lumOff val="15000"/>
-                  </a:prstClr>
-                </a:solidFill>
-                <a:latin typeface="맑은 고딕" panose="020B0503020000020004" pitchFamily="50" charset="-127"/>
-                <a:ea typeface="맑은 고딕" panose="020B0503020000020004" pitchFamily="50" charset="-127"/>
-              </a:rPr>
-              <a:t>Heartbeat </a:t>
-            </a:r>
-            <a:r>
-              <a:rPr lang="ko-KR" altLang="en-US" sz="1600" dirty="0">
-                <a:solidFill>
-                  <a:prstClr val="black">
-                    <a:lumMod val="85000"/>
-                    <a:lumOff val="15000"/>
-                  </a:prstClr>
-                </a:solidFill>
-                <a:latin typeface="맑은 고딕" panose="020B0503020000020004" pitchFamily="50" charset="-127"/>
-                <a:ea typeface="맑은 고딕" panose="020B0503020000020004" pitchFamily="50" charset="-127"/>
-              </a:rPr>
-              <a:t>교환 재개</a:t>
-            </a:r>
             <a:endParaRPr lang="en-US" altLang="ko-KR" sz="1600" dirty="0">
               <a:solidFill>
                 <a:prstClr val="black">

</xml_diff>